<commit_message>
final touches for MMS
</commit_message>
<xml_diff>
--- a/PowerShell Script Analyzer Rules.pptx
+++ b/PowerShell Script Analyzer Rules.pptx
@@ -5,7 +5,7 @@
     <p:sldMasterId id="2147483648" r:id="rId4"/>
   </p:sldMasterIdLst>
   <p:notesMasterIdLst>
-    <p:notesMasterId r:id="rId46"/>
+    <p:notesMasterId r:id="rId47"/>
   </p:notesMasterIdLst>
   <p:sldIdLst>
     <p:sldId id="256" r:id="rId5"/>
@@ -32,23 +32,24 @@
     <p:sldId id="278" r:id="rId26"/>
     <p:sldId id="299" r:id="rId27"/>
     <p:sldId id="300" r:id="rId28"/>
-    <p:sldId id="259" r:id="rId29"/>
-    <p:sldId id="279" r:id="rId30"/>
-    <p:sldId id="298" r:id="rId31"/>
-    <p:sldId id="296" r:id="rId32"/>
-    <p:sldId id="263" r:id="rId33"/>
-    <p:sldId id="264" r:id="rId34"/>
-    <p:sldId id="265" r:id="rId35"/>
-    <p:sldId id="266" r:id="rId36"/>
-    <p:sldId id="268" r:id="rId37"/>
-    <p:sldId id="269" r:id="rId38"/>
-    <p:sldId id="270" r:id="rId39"/>
-    <p:sldId id="271" r:id="rId40"/>
-    <p:sldId id="272" r:id="rId41"/>
-    <p:sldId id="273" r:id="rId42"/>
-    <p:sldId id="274" r:id="rId43"/>
-    <p:sldId id="275" r:id="rId44"/>
-    <p:sldId id="276" r:id="rId45"/>
+    <p:sldId id="301" r:id="rId29"/>
+    <p:sldId id="259" r:id="rId30"/>
+    <p:sldId id="279" r:id="rId31"/>
+    <p:sldId id="298" r:id="rId32"/>
+    <p:sldId id="296" r:id="rId33"/>
+    <p:sldId id="263" r:id="rId34"/>
+    <p:sldId id="264" r:id="rId35"/>
+    <p:sldId id="265" r:id="rId36"/>
+    <p:sldId id="266" r:id="rId37"/>
+    <p:sldId id="268" r:id="rId38"/>
+    <p:sldId id="269" r:id="rId39"/>
+    <p:sldId id="270" r:id="rId40"/>
+    <p:sldId id="271" r:id="rId41"/>
+    <p:sldId id="272" r:id="rId42"/>
+    <p:sldId id="273" r:id="rId43"/>
+    <p:sldId id="274" r:id="rId44"/>
+    <p:sldId id="275" r:id="rId45"/>
+    <p:sldId id="276" r:id="rId46"/>
   </p:sldIdLst>
   <p:sldSz cx="12192000" cy="6858000"/>
   <p:notesSz cx="6858000" cy="9144000"/>
@@ -180,6 +181,7 @@
             <p14:sldId id="278"/>
             <p14:sldId id="299"/>
             <p14:sldId id="300"/>
+            <p14:sldId id="301"/>
           </p14:sldIdLst>
         </p14:section>
         <p14:section name="Closing" id="{49CB15AC-FD56-4AAC-8B8A-68CF2CB85A39}">
@@ -215,6 +217,9 @@
     </p:ext>
     <p:ext uri="{EFAFB233-063F-42B5-8137-9DF3F51BA10A}">
       <p15:sldGuideLst xmlns:p15="http://schemas.microsoft.com/office/powerpoint/2012/main"/>
+    </p:ext>
+    <p:ext uri="{2D200454-40CA-4A62-9FC3-DE9A4176ACB9}">
+      <p15:notesGuideLst xmlns:p15="http://schemas.microsoft.com/office/powerpoint/2012/main"/>
     </p:ext>
   </p:extLst>
 </p:presentation>
@@ -1678,6 +1683,93 @@
     <p:extLst>
       <p:ext uri="{BB962C8B-B14F-4D97-AF65-F5344CB8AC3E}">
         <p14:creationId xmlns:p14="http://schemas.microsoft.com/office/powerpoint/2010/main" val="255123780"/>
+      </p:ext>
+    </p:extLst>
+  </p:cSld>
+  <p:clrMapOvr>
+    <a:masterClrMapping/>
+  </p:clrMapOvr>
+</p:notes>
+</file>
+
+<file path=ppt/notesSlides/notesSlide17.xml><?xml version="1.0" encoding="utf-8"?>
+<p:notes xmlns:a="http://schemas.openxmlformats.org/drawingml/2006/main" xmlns:r="http://schemas.openxmlformats.org/officeDocument/2006/relationships" xmlns:p="http://schemas.openxmlformats.org/presentationml/2006/main">
+  <p:cSld>
+    <p:spTree>
+      <p:nvGrpSpPr>
+        <p:cNvPr id="1" name=""/>
+        <p:cNvGrpSpPr/>
+        <p:nvPr/>
+      </p:nvGrpSpPr>
+      <p:grpSpPr>
+        <a:xfrm>
+          <a:off x="0" y="0"/>
+          <a:ext cx="0" cy="0"/>
+          <a:chOff x="0" y="0"/>
+          <a:chExt cx="0" cy="0"/>
+        </a:xfrm>
+      </p:grpSpPr>
+      <p:sp>
+        <p:nvSpPr>
+          <p:cNvPr id="2" name="Slide Image Placeholder 1"/>
+          <p:cNvSpPr>
+            <a:spLocks noGrp="1" noRot="1" noChangeAspect="1"/>
+          </p:cNvSpPr>
+          <p:nvPr>
+            <p:ph type="sldImg"/>
+          </p:nvPr>
+        </p:nvSpPr>
+        <p:spPr/>
+      </p:sp>
+      <p:sp>
+        <p:nvSpPr>
+          <p:cNvPr id="3" name="Notes Placeholder 2"/>
+          <p:cNvSpPr>
+            <a:spLocks noGrp="1"/>
+          </p:cNvSpPr>
+          <p:nvPr>
+            <p:ph type="body" idx="1"/>
+          </p:nvPr>
+        </p:nvSpPr>
+        <p:spPr/>
+        <p:txBody>
+          <a:bodyPr/>
+          <a:lstStyle/>
+          <a:p>
+            <a:r>
+              <a:rPr lang="en-US" dirty="0"/>
+              <a:t>Hat tip to Ryan Ephgrave</a:t>
+            </a:r>
+          </a:p>
+        </p:txBody>
+      </p:sp>
+      <p:sp>
+        <p:nvSpPr>
+          <p:cNvPr id="4" name="Slide Number Placeholder 3"/>
+          <p:cNvSpPr>
+            <a:spLocks noGrp="1"/>
+          </p:cNvSpPr>
+          <p:nvPr>
+            <p:ph type="sldNum" sz="quarter" idx="10"/>
+          </p:nvPr>
+        </p:nvSpPr>
+        <p:spPr/>
+        <p:txBody>
+          <a:bodyPr/>
+          <a:lstStyle/>
+          <a:p>
+            <a:fld id="{9FF7FDCE-2063-4F6F-B2C0-63F2C3F23836}" type="slidenum">
+              <a:rPr lang="en-US" smtClean="0"/>
+              <a:t>25</a:t>
+            </a:fld>
+            <a:endParaRPr lang="en-US"/>
+          </a:p>
+        </p:txBody>
+      </p:sp>
+    </p:spTree>
+    <p:extLst>
+      <p:ext uri="{BB962C8B-B14F-4D97-AF65-F5344CB8AC3E}">
+        <p14:creationId xmlns:p14="http://schemas.microsoft.com/office/powerpoint/2010/main" val="194866913"/>
       </p:ext>
     </p:extLst>
   </p:cSld>
@@ -9849,10 +9941,157 @@
           <a:chExt cx="0" cy="0"/>
         </a:xfrm>
       </p:grpSpPr>
+      <p:sp>
+        <p:nvSpPr>
+          <p:cNvPr id="2" name="Title 1"/>
+          <p:cNvSpPr>
+            <a:spLocks noGrp="1"/>
+          </p:cNvSpPr>
+          <p:nvPr>
+            <p:ph type="title"/>
+          </p:nvPr>
+        </p:nvSpPr>
+        <p:spPr/>
+        <p:txBody>
+          <a:bodyPr/>
+          <a:lstStyle/>
+          <a:p>
+            <a:r>
+              <a:rPr lang="en-US" dirty="0"/>
+              <a:t>Integrating With VS Code</a:t>
+            </a:r>
+          </a:p>
+        </p:txBody>
+      </p:sp>
+      <p:sp>
+        <p:nvSpPr>
+          <p:cNvPr id="3" name="Content Placeholder 2"/>
+          <p:cNvSpPr>
+            <a:spLocks noGrp="1"/>
+          </p:cNvSpPr>
+          <p:nvPr>
+            <p:ph idx="1"/>
+          </p:nvPr>
+        </p:nvSpPr>
+        <p:spPr>
+          <a:xfrm>
+            <a:off x="609600" y="1257300"/>
+            <a:ext cx="10972800" cy="4800600"/>
+          </a:xfrm>
+        </p:spPr>
+        <p:txBody>
+          <a:bodyPr/>
+          <a:lstStyle/>
+          <a:p>
+            <a:r>
+              <a:rPr lang="en-US" dirty="0"/>
+              <a:t>1. Create a CodeFormatting.psd1</a:t>
+            </a:r>
+          </a:p>
+          <a:p>
+            <a:endParaRPr lang="en-US" dirty="0"/>
+          </a:p>
+          <a:p>
+            <a:endParaRPr lang="en-US" dirty="0"/>
+          </a:p>
+          <a:p>
+            <a:endParaRPr lang="en-US" dirty="0"/>
+          </a:p>
+          <a:p>
+            <a:r>
+              <a:rPr lang="en-US" dirty="0"/>
+              <a:t>2. Configure the PowerShell extension to use this code formatting definition.</a:t>
+            </a:r>
+          </a:p>
+          <a:p>
+            <a:pPr marL="0" indent="0">
+              <a:buNone/>
+            </a:pPr>
+            <a:endParaRPr lang="en-US" dirty="0"/>
+          </a:p>
+        </p:txBody>
+      </p:sp>
+      <p:pic>
+        <p:nvPicPr>
+          <p:cNvPr id="4" name="Picture 3">
+            <a:extLst>
+              <a:ext uri="{FF2B5EF4-FFF2-40B4-BE49-F238E27FC236}">
+                <a16:creationId xmlns:a16="http://schemas.microsoft.com/office/drawing/2014/main" id="{E6C16874-607E-46D3-ABAB-36FC971BF7AF}"/>
+              </a:ext>
+            </a:extLst>
+          </p:cNvPr>
+          <p:cNvPicPr>
+            <a:picLocks noChangeAspect="1"/>
+          </p:cNvPicPr>
+          <p:nvPr/>
+        </p:nvPicPr>
+        <p:blipFill>
+          <a:blip r:embed="rId3"/>
+          <a:stretch>
+            <a:fillRect/>
+          </a:stretch>
+        </p:blipFill>
+        <p:spPr>
+          <a:xfrm>
+            <a:off x="980440" y="1662430"/>
+            <a:ext cx="8686800" cy="1257300"/>
+          </a:xfrm>
+          <a:prstGeom prst="rect">
+            <a:avLst/>
+          </a:prstGeom>
+        </p:spPr>
+      </p:pic>
+      <p:pic>
+        <p:nvPicPr>
+          <p:cNvPr id="1026" name="Picture 2" descr="C:\Users\fbain\AppData\Local\Temp\SNAGHTMLc141c91.PNG">
+            <a:extLst>
+              <a:ext uri="{FF2B5EF4-FFF2-40B4-BE49-F238E27FC236}">
+                <a16:creationId xmlns:a16="http://schemas.microsoft.com/office/drawing/2014/main" id="{1AFAF5DE-9E58-4F4F-9639-0B898858A940}"/>
+              </a:ext>
+            </a:extLst>
+          </p:cNvPr>
+          <p:cNvPicPr>
+            <a:picLocks noChangeAspect="1" noChangeArrowheads="1"/>
+          </p:cNvPicPr>
+          <p:nvPr/>
+        </p:nvPicPr>
+        <p:blipFill>
+          <a:blip r:embed="rId4">
+            <a:extLst>
+              <a:ext uri="{28A0092B-C50C-407E-A947-70E740481C1C}">
+                <a14:useLocalDpi xmlns:a14="http://schemas.microsoft.com/office/drawing/2010/main" val="0"/>
+              </a:ext>
+            </a:extLst>
+          </a:blip>
+          <a:srcRect/>
+          <a:stretch>
+            <a:fillRect/>
+          </a:stretch>
+        </p:blipFill>
+        <p:spPr bwMode="auto">
+          <a:xfrm>
+            <a:off x="980440" y="3641089"/>
+            <a:ext cx="10144125" cy="847725"/>
+          </a:xfrm>
+          <a:prstGeom prst="rect">
+            <a:avLst/>
+          </a:prstGeom>
+          <a:noFill/>
+          <a:extLst>
+            <a:ext uri="{909E8E84-426E-40DD-AFC4-6F175D3DCCD1}">
+              <a14:hiddenFill xmlns:a14="http://schemas.microsoft.com/office/drawing/2010/main">
+                <a:solidFill>
+                  <a:srgbClr val="FFFFFF"/>
+                </a:solidFill>
+              </a14:hiddenFill>
+            </a:ext>
+          </a:extLst>
+        </p:spPr>
+      </p:pic>
     </p:spTree>
     <p:extLst>
       <p:ext uri="{BB962C8B-B14F-4D97-AF65-F5344CB8AC3E}">
-        <p14:creationId xmlns:p14="http://schemas.microsoft.com/office/powerpoint/2010/main" val="4063178677"/>
+        <p14:creationId xmlns:p14="http://schemas.microsoft.com/office/powerpoint/2010/main" val="1505739152"/>
       </p:ext>
     </p:extLst>
   </p:cSld>
@@ -9879,6 +10118,36 @@
           <a:chExt cx="0" cy="0"/>
         </a:xfrm>
       </p:grpSpPr>
+    </p:spTree>
+    <p:extLst>
+      <p:ext uri="{BB962C8B-B14F-4D97-AF65-F5344CB8AC3E}">
+        <p14:creationId xmlns:p14="http://schemas.microsoft.com/office/powerpoint/2010/main" val="4063178677"/>
+      </p:ext>
+    </p:extLst>
+  </p:cSld>
+  <p:clrMapOvr>
+    <a:masterClrMapping/>
+  </p:clrMapOvr>
+</p:sld>
+</file>
+
+<file path=ppt/slides/slide27.xml><?xml version="1.0" encoding="utf-8"?>
+<p:sld xmlns:a="http://schemas.openxmlformats.org/drawingml/2006/main" xmlns:r="http://schemas.openxmlformats.org/officeDocument/2006/relationships" xmlns:p="http://schemas.openxmlformats.org/presentationml/2006/main">
+  <p:cSld>
+    <p:spTree>
+      <p:nvGrpSpPr>
+        <p:cNvPr id="1" name=""/>
+        <p:cNvGrpSpPr/>
+        <p:nvPr/>
+      </p:nvGrpSpPr>
+      <p:grpSpPr>
+        <a:xfrm>
+          <a:off x="0" y="0"/>
+          <a:ext cx="0" cy="0"/>
+          <a:chOff x="0" y="0"/>
+          <a:chExt cx="0" cy="0"/>
+        </a:xfrm>
+      </p:grpSpPr>
       <p:pic>
         <p:nvPicPr>
           <p:cNvPr id="6" name="Picture 5"/>
@@ -9968,7 +10237,7 @@
 </p:sld>
 </file>
 
-<file path=ppt/slides/slide27.xml><?xml version="1.0" encoding="utf-8"?>
+<file path=ppt/slides/slide28.xml><?xml version="1.0" encoding="utf-8"?>
 <p:sld xmlns:a="http://schemas.openxmlformats.org/drawingml/2006/main" xmlns:r="http://schemas.openxmlformats.org/officeDocument/2006/relationships" xmlns:p="http://schemas.openxmlformats.org/presentationml/2006/main" show="0">
   <p:cSld>
     <p:spTree>
@@ -10066,7 +10335,7 @@
 </p:sld>
 </file>
 
-<file path=ppt/slides/slide28.xml><?xml version="1.0" encoding="utf-8"?>
+<file path=ppt/slides/slide29.xml><?xml version="1.0" encoding="utf-8"?>
 <p:sld xmlns:a="http://schemas.openxmlformats.org/drawingml/2006/main" xmlns:r="http://schemas.openxmlformats.org/officeDocument/2006/relationships" xmlns:p="http://schemas.openxmlformats.org/presentationml/2006/main" show="0">
   <p:cSld>
     <p:spTree>
@@ -10131,79 +10400,6 @@
     <p:extLst>
       <p:ext uri="{BB962C8B-B14F-4D97-AF65-F5344CB8AC3E}">
         <p14:creationId xmlns:p14="http://schemas.microsoft.com/office/powerpoint/2010/main" val="1872366448"/>
-      </p:ext>
-    </p:extLst>
-  </p:cSld>
-  <p:clrMapOvr>
-    <a:masterClrMapping/>
-  </p:clrMapOvr>
-</p:sld>
-</file>
-
-<file path=ppt/slides/slide29.xml><?xml version="1.0" encoding="utf-8"?>
-<p:sld xmlns:a="http://schemas.openxmlformats.org/drawingml/2006/main" xmlns:r="http://schemas.openxmlformats.org/officeDocument/2006/relationships" xmlns:p="http://schemas.openxmlformats.org/presentationml/2006/main" show="0">
-  <p:cSld>
-    <p:spTree>
-      <p:nvGrpSpPr>
-        <p:cNvPr id="1" name=""/>
-        <p:cNvGrpSpPr/>
-        <p:nvPr/>
-      </p:nvGrpSpPr>
-      <p:grpSpPr>
-        <a:xfrm>
-          <a:off x="0" y="0"/>
-          <a:ext cx="0" cy="0"/>
-          <a:chOff x="0" y="0"/>
-          <a:chExt cx="0" cy="0"/>
-        </a:xfrm>
-      </p:grpSpPr>
-      <p:sp>
-        <p:nvSpPr>
-          <p:cNvPr id="4" name="Content Placeholder 3"/>
-          <p:cNvSpPr>
-            <a:spLocks noGrp="1"/>
-          </p:cNvSpPr>
-          <p:nvPr>
-            <p:ph idx="1"/>
-          </p:nvPr>
-        </p:nvSpPr>
-        <p:spPr/>
-        <p:txBody>
-          <a:bodyPr/>
-          <a:lstStyle/>
-          <a:p>
-            <a:r>
-              <a:rPr lang="en-US" dirty="0"/>
-              <a:t>Text Only with Border</a:t>
-            </a:r>
-          </a:p>
-          <a:p>
-            <a:pPr lvl="1"/>
-            <a:r>
-              <a:rPr lang="en-US" dirty="0"/>
-              <a:t>Level 1</a:t>
-            </a:r>
-          </a:p>
-          <a:p>
-            <a:pPr lvl="2"/>
-            <a:r>
-              <a:rPr lang="en-US" dirty="0"/>
-              <a:t>Level 2 </a:t>
-            </a:r>
-          </a:p>
-          <a:p>
-            <a:pPr lvl="3"/>
-            <a:r>
-              <a:rPr lang="en-US" dirty="0"/>
-              <a:t>Level 3</a:t>
-            </a:r>
-          </a:p>
-        </p:txBody>
-      </p:sp>
-    </p:spTree>
-    <p:extLst>
-      <p:ext uri="{BB962C8B-B14F-4D97-AF65-F5344CB8AC3E}">
-        <p14:creationId xmlns:p14="http://schemas.microsoft.com/office/powerpoint/2010/main" val="659284950"/>
       </p:ext>
     </p:extLst>
   </p:cSld>
@@ -10306,6 +10502,79 @@
       </p:grpSpPr>
       <p:sp>
         <p:nvSpPr>
+          <p:cNvPr id="4" name="Content Placeholder 3"/>
+          <p:cNvSpPr>
+            <a:spLocks noGrp="1"/>
+          </p:cNvSpPr>
+          <p:nvPr>
+            <p:ph idx="1"/>
+          </p:nvPr>
+        </p:nvSpPr>
+        <p:spPr/>
+        <p:txBody>
+          <a:bodyPr/>
+          <a:lstStyle/>
+          <a:p>
+            <a:r>
+              <a:rPr lang="en-US" dirty="0"/>
+              <a:t>Text Only with Border</a:t>
+            </a:r>
+          </a:p>
+          <a:p>
+            <a:pPr lvl="1"/>
+            <a:r>
+              <a:rPr lang="en-US" dirty="0"/>
+              <a:t>Level 1</a:t>
+            </a:r>
+          </a:p>
+          <a:p>
+            <a:pPr lvl="2"/>
+            <a:r>
+              <a:rPr lang="en-US" dirty="0"/>
+              <a:t>Level 2 </a:t>
+            </a:r>
+          </a:p>
+          <a:p>
+            <a:pPr lvl="3"/>
+            <a:r>
+              <a:rPr lang="en-US" dirty="0"/>
+              <a:t>Level 3</a:t>
+            </a:r>
+          </a:p>
+        </p:txBody>
+      </p:sp>
+    </p:spTree>
+    <p:extLst>
+      <p:ext uri="{BB962C8B-B14F-4D97-AF65-F5344CB8AC3E}">
+        <p14:creationId xmlns:p14="http://schemas.microsoft.com/office/powerpoint/2010/main" val="659284950"/>
+      </p:ext>
+    </p:extLst>
+  </p:cSld>
+  <p:clrMapOvr>
+    <a:masterClrMapping/>
+  </p:clrMapOvr>
+</p:sld>
+</file>
+
+<file path=ppt/slides/slide31.xml><?xml version="1.0" encoding="utf-8"?>
+<p:sld xmlns:a="http://schemas.openxmlformats.org/drawingml/2006/main" xmlns:r="http://schemas.openxmlformats.org/officeDocument/2006/relationships" xmlns:p="http://schemas.openxmlformats.org/presentationml/2006/main" show="0">
+  <p:cSld>
+    <p:spTree>
+      <p:nvGrpSpPr>
+        <p:cNvPr id="1" name=""/>
+        <p:cNvGrpSpPr/>
+        <p:nvPr/>
+      </p:nvGrpSpPr>
+      <p:grpSpPr>
+        <a:xfrm>
+          <a:off x="0" y="0"/>
+          <a:ext cx="0" cy="0"/>
+          <a:chOff x="0" y="0"/>
+          <a:chExt cx="0" cy="0"/>
+        </a:xfrm>
+      </p:grpSpPr>
+      <p:sp>
+        <p:nvSpPr>
           <p:cNvPr id="3" name="Content Placeholder 2"/>
           <p:cNvSpPr>
             <a:spLocks noGrp="1"/>
@@ -10360,7 +10629,7 @@
 </p:sld>
 </file>
 
-<file path=ppt/slides/slide31.xml><?xml version="1.0" encoding="utf-8"?>
+<file path=ppt/slides/slide32.xml><?xml version="1.0" encoding="utf-8"?>
 <p:sld xmlns:a="http://schemas.openxmlformats.org/drawingml/2006/main" xmlns:r="http://schemas.openxmlformats.org/officeDocument/2006/relationships" xmlns:p="http://schemas.openxmlformats.org/presentationml/2006/main" show="0">
   <p:cSld>
     <p:spTree>
@@ -10504,7 +10773,7 @@
 </p:sld>
 </file>
 
-<file path=ppt/slides/slide32.xml><?xml version="1.0" encoding="utf-8"?>
+<file path=ppt/slides/slide33.xml><?xml version="1.0" encoding="utf-8"?>
 <p:sld xmlns:a="http://schemas.openxmlformats.org/drawingml/2006/main" xmlns:r="http://schemas.openxmlformats.org/officeDocument/2006/relationships" xmlns:p="http://schemas.openxmlformats.org/presentationml/2006/main" show="0">
   <p:cSld>
     <p:spTree>
@@ -10692,901 +10961,6 @@
 </p:sld>
 </file>
 
-<file path=ppt/slides/slide33.xml><?xml version="1.0" encoding="utf-8"?>
-<p:sld xmlns:a="http://schemas.openxmlformats.org/drawingml/2006/main" xmlns:r="http://schemas.openxmlformats.org/officeDocument/2006/relationships" xmlns:p="http://schemas.openxmlformats.org/presentationml/2006/main" show="0">
-  <p:cSld>
-    <p:spTree>
-      <p:nvGrpSpPr>
-        <p:cNvPr id="1" name=""/>
-        <p:cNvGrpSpPr/>
-        <p:nvPr/>
-      </p:nvGrpSpPr>
-      <p:grpSpPr>
-        <a:xfrm>
-          <a:off x="0" y="0"/>
-          <a:ext cx="0" cy="0"/>
-          <a:chOff x="0" y="0"/>
-          <a:chExt cx="0" cy="0"/>
-        </a:xfrm>
-      </p:grpSpPr>
-      <p:pic>
-        <p:nvPicPr>
-          <p:cNvPr id="11" name="Picture 10"/>
-          <p:cNvPicPr>
-            <a:picLocks noChangeAspect="1"/>
-          </p:cNvPicPr>
-          <p:nvPr/>
-        </p:nvPicPr>
-        <p:blipFill>
-          <a:blip r:embed="rId2">
-            <a:extLst>
-              <a:ext uri="{28A0092B-C50C-407E-A947-70E740481C1C}">
-                <a14:useLocalDpi xmlns:a14="http://schemas.microsoft.com/office/drawing/2010/main" val="0"/>
-              </a:ext>
-            </a:extLst>
-          </a:blip>
-          <a:stretch>
-            <a:fillRect/>
-          </a:stretch>
-        </p:blipFill>
-        <p:spPr>
-          <a:xfrm>
-            <a:off x="2207458" y="453313"/>
-            <a:ext cx="457200" cy="457200"/>
-          </a:xfrm>
-          <a:prstGeom prst="rect">
-            <a:avLst/>
-          </a:prstGeom>
-        </p:spPr>
-      </p:pic>
-      <p:pic>
-        <p:nvPicPr>
-          <p:cNvPr id="12" name="Picture 11"/>
-          <p:cNvPicPr>
-            <a:picLocks noChangeAspect="1"/>
-          </p:cNvPicPr>
-          <p:nvPr/>
-        </p:nvPicPr>
-        <p:blipFill>
-          <a:blip r:embed="rId3">
-            <a:extLst>
-              <a:ext uri="{28A0092B-C50C-407E-A947-70E740481C1C}">
-                <a14:useLocalDpi xmlns:a14="http://schemas.microsoft.com/office/drawing/2010/main" val="0"/>
-              </a:ext>
-            </a:extLst>
-          </a:blip>
-          <a:stretch>
-            <a:fillRect/>
-          </a:stretch>
-        </p:blipFill>
-        <p:spPr>
-          <a:xfrm>
-            <a:off x="1294229" y="453399"/>
-            <a:ext cx="457200" cy="457200"/>
-          </a:xfrm>
-          <a:prstGeom prst="rect">
-            <a:avLst/>
-          </a:prstGeom>
-        </p:spPr>
-      </p:pic>
-      <p:pic>
-        <p:nvPicPr>
-          <p:cNvPr id="13" name="Picture 12"/>
-          <p:cNvPicPr>
-            <a:picLocks noChangeAspect="1"/>
-          </p:cNvPicPr>
-          <p:nvPr/>
-        </p:nvPicPr>
-        <p:blipFill>
-          <a:blip r:embed="rId4">
-            <a:extLst>
-              <a:ext uri="{28A0092B-C50C-407E-A947-70E740481C1C}">
-                <a14:useLocalDpi xmlns:a14="http://schemas.microsoft.com/office/drawing/2010/main" val="0"/>
-              </a:ext>
-            </a:extLst>
-          </a:blip>
-          <a:stretch>
-            <a:fillRect/>
-          </a:stretch>
-        </p:blipFill>
-        <p:spPr>
-          <a:xfrm>
-            <a:off x="381000" y="453399"/>
-            <a:ext cx="457200" cy="457200"/>
-          </a:xfrm>
-          <a:prstGeom prst="rect">
-            <a:avLst/>
-          </a:prstGeom>
-        </p:spPr>
-      </p:pic>
-      <p:pic>
-        <p:nvPicPr>
-          <p:cNvPr id="15" name="Picture 14"/>
-          <p:cNvPicPr>
-            <a:picLocks noChangeAspect="1"/>
-          </p:cNvPicPr>
-          <p:nvPr/>
-        </p:nvPicPr>
-        <p:blipFill>
-          <a:blip r:embed="rId5">
-            <a:lum bright="70000" contrast="-70000"/>
-            <a:extLst>
-              <a:ext uri="{28A0092B-C50C-407E-A947-70E740481C1C}">
-                <a14:useLocalDpi xmlns:a14="http://schemas.microsoft.com/office/drawing/2010/main" val="0"/>
-              </a:ext>
-            </a:extLst>
-          </a:blip>
-          <a:stretch>
-            <a:fillRect/>
-          </a:stretch>
-        </p:blipFill>
-        <p:spPr>
-          <a:xfrm>
-            <a:off x="303629" y="1070428"/>
-            <a:ext cx="1219200" cy="1219200"/>
-          </a:xfrm>
-          <a:prstGeom prst="rect">
-            <a:avLst/>
-          </a:prstGeom>
-        </p:spPr>
-      </p:pic>
-      <p:pic>
-        <p:nvPicPr>
-          <p:cNvPr id="279" name="Picture 278"/>
-          <p:cNvPicPr>
-            <a:picLocks noChangeAspect="1"/>
-          </p:cNvPicPr>
-          <p:nvPr/>
-        </p:nvPicPr>
-        <p:blipFill>
-          <a:blip r:embed="rId6">
-            <a:lum bright="70000" contrast="-70000"/>
-            <a:extLst>
-              <a:ext uri="{28A0092B-C50C-407E-A947-70E740481C1C}">
-                <a14:useLocalDpi xmlns:a14="http://schemas.microsoft.com/office/drawing/2010/main" val="0"/>
-              </a:ext>
-            </a:extLst>
-          </a:blip>
-          <a:stretch>
-            <a:fillRect/>
-          </a:stretch>
-        </p:blipFill>
-        <p:spPr>
-          <a:xfrm>
-            <a:off x="2950029" y="1070428"/>
-            <a:ext cx="1219200" cy="1219200"/>
-          </a:xfrm>
-          <a:prstGeom prst="rect">
-            <a:avLst/>
-          </a:prstGeom>
-        </p:spPr>
-      </p:pic>
-      <p:pic>
-        <p:nvPicPr>
-          <p:cNvPr id="280" name="Picture 279"/>
-          <p:cNvPicPr>
-            <a:picLocks noChangeAspect="1"/>
-          </p:cNvPicPr>
-          <p:nvPr/>
-        </p:nvPicPr>
-        <p:blipFill>
-          <a:blip r:embed="rId7">
-            <a:lum bright="70000" contrast="-70000"/>
-            <a:extLst>
-              <a:ext uri="{28A0092B-C50C-407E-A947-70E740481C1C}">
-                <a14:useLocalDpi xmlns:a14="http://schemas.microsoft.com/office/drawing/2010/main" val="0"/>
-              </a:ext>
-            </a:extLst>
-          </a:blip>
-          <a:stretch>
-            <a:fillRect/>
-          </a:stretch>
-        </p:blipFill>
-        <p:spPr>
-          <a:xfrm>
-            <a:off x="1626829" y="1070428"/>
-            <a:ext cx="1219200" cy="1219200"/>
-          </a:xfrm>
-          <a:prstGeom prst="rect">
-            <a:avLst/>
-          </a:prstGeom>
-        </p:spPr>
-      </p:pic>
-      <p:pic>
-        <p:nvPicPr>
-          <p:cNvPr id="281" name="Picture 280"/>
-          <p:cNvPicPr>
-            <a:picLocks noChangeAspect="1"/>
-          </p:cNvPicPr>
-          <p:nvPr/>
-        </p:nvPicPr>
-        <p:blipFill>
-          <a:blip r:embed="rId8">
-            <a:lum bright="70000" contrast="-70000"/>
-            <a:extLst>
-              <a:ext uri="{28A0092B-C50C-407E-A947-70E740481C1C}">
-                <a14:useLocalDpi xmlns:a14="http://schemas.microsoft.com/office/drawing/2010/main" val="0"/>
-              </a:ext>
-            </a:extLst>
-          </a:blip>
-          <a:stretch>
-            <a:fillRect/>
-          </a:stretch>
-        </p:blipFill>
-        <p:spPr>
-          <a:xfrm>
-            <a:off x="5596429" y="1107999"/>
-            <a:ext cx="1219200" cy="1219200"/>
-          </a:xfrm>
-          <a:prstGeom prst="rect">
-            <a:avLst/>
-          </a:prstGeom>
-        </p:spPr>
-      </p:pic>
-      <p:pic>
-        <p:nvPicPr>
-          <p:cNvPr id="282" name="Picture 281"/>
-          <p:cNvPicPr>
-            <a:picLocks noChangeAspect="1"/>
-          </p:cNvPicPr>
-          <p:nvPr/>
-        </p:nvPicPr>
-        <p:blipFill>
-          <a:blip r:embed="rId9">
-            <a:lum bright="70000" contrast="-70000"/>
-            <a:extLst>
-              <a:ext uri="{28A0092B-C50C-407E-A947-70E740481C1C}">
-                <a14:useLocalDpi xmlns:a14="http://schemas.microsoft.com/office/drawing/2010/main" val="0"/>
-              </a:ext>
-            </a:extLst>
-          </a:blip>
-          <a:stretch>
-            <a:fillRect/>
-          </a:stretch>
-        </p:blipFill>
-        <p:spPr>
-          <a:xfrm>
-            <a:off x="4273229" y="1070428"/>
-            <a:ext cx="1219200" cy="1219200"/>
-          </a:xfrm>
-          <a:prstGeom prst="rect">
-            <a:avLst/>
-          </a:prstGeom>
-        </p:spPr>
-      </p:pic>
-      <p:pic>
-        <p:nvPicPr>
-          <p:cNvPr id="283" name="Picture 282"/>
-          <p:cNvPicPr>
-            <a:picLocks noChangeAspect="1"/>
-          </p:cNvPicPr>
-          <p:nvPr/>
-        </p:nvPicPr>
-        <p:blipFill>
-          <a:blip r:embed="rId10">
-            <a:lum bright="70000" contrast="-70000"/>
-            <a:extLst>
-              <a:ext uri="{28A0092B-C50C-407E-A947-70E740481C1C}">
-                <a14:useLocalDpi xmlns:a14="http://schemas.microsoft.com/office/drawing/2010/main" val="0"/>
-              </a:ext>
-            </a:extLst>
-          </a:blip>
-          <a:stretch>
-            <a:fillRect/>
-          </a:stretch>
-        </p:blipFill>
-        <p:spPr>
-          <a:xfrm>
-            <a:off x="6919629" y="1107999"/>
-            <a:ext cx="1219200" cy="1219200"/>
-          </a:xfrm>
-          <a:prstGeom prst="rect">
-            <a:avLst/>
-          </a:prstGeom>
-        </p:spPr>
-      </p:pic>
-      <p:pic>
-        <p:nvPicPr>
-          <p:cNvPr id="284" name="Picture 283"/>
-          <p:cNvPicPr>
-            <a:picLocks noChangeAspect="1"/>
-          </p:cNvPicPr>
-          <p:nvPr/>
-        </p:nvPicPr>
-        <p:blipFill>
-          <a:blip r:embed="rId11">
-            <a:lum bright="70000" contrast="-70000"/>
-            <a:extLst>
-              <a:ext uri="{28A0092B-C50C-407E-A947-70E740481C1C}">
-                <a14:useLocalDpi xmlns:a14="http://schemas.microsoft.com/office/drawing/2010/main" val="0"/>
-              </a:ext>
-            </a:extLst>
-          </a:blip>
-          <a:stretch>
-            <a:fillRect/>
-          </a:stretch>
-        </p:blipFill>
-        <p:spPr>
-          <a:xfrm>
-            <a:off x="9105600" y="1070428"/>
-            <a:ext cx="1219200" cy="1219200"/>
-          </a:xfrm>
-          <a:prstGeom prst="rect">
-            <a:avLst/>
-          </a:prstGeom>
-        </p:spPr>
-      </p:pic>
-      <p:pic>
-        <p:nvPicPr>
-          <p:cNvPr id="285" name="Picture 284"/>
-          <p:cNvPicPr>
-            <a:picLocks noChangeAspect="1"/>
-          </p:cNvPicPr>
-          <p:nvPr/>
-        </p:nvPicPr>
-        <p:blipFill>
-          <a:blip r:embed="rId12">
-            <a:lum bright="70000" contrast="-70000"/>
-            <a:extLst>
-              <a:ext uri="{28A0092B-C50C-407E-A947-70E740481C1C}">
-                <a14:useLocalDpi xmlns:a14="http://schemas.microsoft.com/office/drawing/2010/main" val="0"/>
-              </a:ext>
-            </a:extLst>
-          </a:blip>
-          <a:stretch>
-            <a:fillRect/>
-          </a:stretch>
-        </p:blipFill>
-        <p:spPr>
-          <a:xfrm>
-            <a:off x="7988286" y="1070428"/>
-            <a:ext cx="1219200" cy="1219200"/>
-          </a:xfrm>
-          <a:prstGeom prst="rect">
-            <a:avLst/>
-          </a:prstGeom>
-        </p:spPr>
-      </p:pic>
-      <p:pic>
-        <p:nvPicPr>
-          <p:cNvPr id="286" name="Picture 285"/>
-          <p:cNvPicPr>
-            <a:picLocks noChangeAspect="1"/>
-          </p:cNvPicPr>
-          <p:nvPr/>
-        </p:nvPicPr>
-        <p:blipFill>
-          <a:blip r:embed="rId13">
-            <a:lum bright="70000" contrast="-70000"/>
-            <a:extLst>
-              <a:ext uri="{28A0092B-C50C-407E-A947-70E740481C1C}">
-                <a14:useLocalDpi xmlns:a14="http://schemas.microsoft.com/office/drawing/2010/main" val="0"/>
-              </a:ext>
-            </a:extLst>
-          </a:blip>
-          <a:stretch>
-            <a:fillRect/>
-          </a:stretch>
-        </p:blipFill>
-        <p:spPr>
-          <a:xfrm>
-            <a:off x="303629" y="2185742"/>
-            <a:ext cx="1219200" cy="1219200"/>
-          </a:xfrm>
-          <a:prstGeom prst="rect">
-            <a:avLst/>
-          </a:prstGeom>
-        </p:spPr>
-      </p:pic>
-      <p:pic>
-        <p:nvPicPr>
-          <p:cNvPr id="287" name="Picture 286"/>
-          <p:cNvPicPr>
-            <a:picLocks noChangeAspect="1"/>
-          </p:cNvPicPr>
-          <p:nvPr/>
-        </p:nvPicPr>
-        <p:blipFill>
-          <a:blip r:embed="rId14">
-            <a:lum bright="70000" contrast="-70000"/>
-            <a:extLst>
-              <a:ext uri="{28A0092B-C50C-407E-A947-70E740481C1C}">
-                <a14:useLocalDpi xmlns:a14="http://schemas.microsoft.com/office/drawing/2010/main" val="0"/>
-              </a:ext>
-            </a:extLst>
-          </a:blip>
-          <a:stretch>
-            <a:fillRect/>
-          </a:stretch>
-        </p:blipFill>
-        <p:spPr>
-          <a:xfrm>
-            <a:off x="10484143" y="1070428"/>
-            <a:ext cx="1219200" cy="1219200"/>
-          </a:xfrm>
-          <a:prstGeom prst="rect">
-            <a:avLst/>
-          </a:prstGeom>
-        </p:spPr>
-      </p:pic>
-      <p:pic>
-        <p:nvPicPr>
-          <p:cNvPr id="288" name="Picture 287"/>
-          <p:cNvPicPr>
-            <a:picLocks noChangeAspect="1"/>
-          </p:cNvPicPr>
-          <p:nvPr/>
-        </p:nvPicPr>
-        <p:blipFill>
-          <a:blip r:embed="rId15">
-            <a:lum bright="70000" contrast="-70000"/>
-            <a:extLst>
-              <a:ext uri="{28A0092B-C50C-407E-A947-70E740481C1C}">
-                <a14:useLocalDpi xmlns:a14="http://schemas.microsoft.com/office/drawing/2010/main" val="0"/>
-              </a:ext>
-            </a:extLst>
-          </a:blip>
-          <a:stretch>
-            <a:fillRect/>
-          </a:stretch>
-        </p:blipFill>
-        <p:spPr>
-          <a:xfrm>
-            <a:off x="2923629" y="2421599"/>
-            <a:ext cx="1219200" cy="1219200"/>
-          </a:xfrm>
-          <a:prstGeom prst="rect">
-            <a:avLst/>
-          </a:prstGeom>
-        </p:spPr>
-      </p:pic>
-      <p:pic>
-        <p:nvPicPr>
-          <p:cNvPr id="289" name="Picture 288"/>
-          <p:cNvPicPr>
-            <a:picLocks noChangeAspect="1"/>
-          </p:cNvPicPr>
-          <p:nvPr/>
-        </p:nvPicPr>
-        <p:blipFill>
-          <a:blip r:embed="rId16">
-            <a:lum bright="70000" contrast="-70000"/>
-            <a:extLst>
-              <a:ext uri="{28A0092B-C50C-407E-A947-70E740481C1C}">
-                <a14:useLocalDpi xmlns:a14="http://schemas.microsoft.com/office/drawing/2010/main" val="0"/>
-              </a:ext>
-            </a:extLst>
-          </a:blip>
-          <a:stretch>
-            <a:fillRect/>
-          </a:stretch>
-        </p:blipFill>
-        <p:spPr>
-          <a:xfrm>
-            <a:off x="4273229" y="2454485"/>
-            <a:ext cx="1219200" cy="1219200"/>
-          </a:xfrm>
-          <a:prstGeom prst="rect">
-            <a:avLst/>
-          </a:prstGeom>
-        </p:spPr>
-      </p:pic>
-      <p:pic>
-        <p:nvPicPr>
-          <p:cNvPr id="290" name="Picture 289"/>
-          <p:cNvPicPr>
-            <a:picLocks noChangeAspect="1"/>
-          </p:cNvPicPr>
-          <p:nvPr/>
-        </p:nvPicPr>
-        <p:blipFill>
-          <a:blip r:embed="rId17">
-            <a:lum bright="70000" contrast="-70000"/>
-            <a:extLst>
-              <a:ext uri="{28A0092B-C50C-407E-A947-70E740481C1C}">
-                <a14:useLocalDpi xmlns:a14="http://schemas.microsoft.com/office/drawing/2010/main" val="0"/>
-              </a:ext>
-            </a:extLst>
-          </a:blip>
-          <a:stretch>
-            <a:fillRect/>
-          </a:stretch>
-        </p:blipFill>
-        <p:spPr>
-          <a:xfrm>
-            <a:off x="1704429" y="2421599"/>
-            <a:ext cx="1219200" cy="1219200"/>
-          </a:xfrm>
-          <a:prstGeom prst="rect">
-            <a:avLst/>
-          </a:prstGeom>
-        </p:spPr>
-      </p:pic>
-      <p:pic>
-        <p:nvPicPr>
-          <p:cNvPr id="291" name="Picture 290"/>
-          <p:cNvPicPr>
-            <a:picLocks noChangeAspect="1"/>
-          </p:cNvPicPr>
-          <p:nvPr/>
-        </p:nvPicPr>
-        <p:blipFill>
-          <a:blip r:embed="rId18">
-            <a:lum bright="70000" contrast="-70000"/>
-            <a:extLst>
-              <a:ext uri="{28A0092B-C50C-407E-A947-70E740481C1C}">
-                <a14:useLocalDpi xmlns:a14="http://schemas.microsoft.com/office/drawing/2010/main" val="0"/>
-              </a:ext>
-            </a:extLst>
-          </a:blip>
-          <a:stretch>
-            <a:fillRect/>
-          </a:stretch>
-        </p:blipFill>
-        <p:spPr>
-          <a:xfrm>
-            <a:off x="6976800" y="2439628"/>
-            <a:ext cx="1219200" cy="1219200"/>
-          </a:xfrm>
-          <a:prstGeom prst="rect">
-            <a:avLst/>
-          </a:prstGeom>
-        </p:spPr>
-      </p:pic>
-      <p:pic>
-        <p:nvPicPr>
-          <p:cNvPr id="292" name="Picture 291"/>
-          <p:cNvPicPr>
-            <a:picLocks noChangeAspect="1"/>
-          </p:cNvPicPr>
-          <p:nvPr/>
-        </p:nvPicPr>
-        <p:blipFill>
-          <a:blip r:embed="rId19">
-            <a:lum bright="70000" contrast="-70000"/>
-            <a:extLst>
-              <a:ext uri="{28A0092B-C50C-407E-A947-70E740481C1C}">
-                <a14:useLocalDpi xmlns:a14="http://schemas.microsoft.com/office/drawing/2010/main" val="0"/>
-              </a:ext>
-            </a:extLst>
-          </a:blip>
-          <a:stretch>
-            <a:fillRect/>
-          </a:stretch>
-        </p:blipFill>
-        <p:spPr>
-          <a:xfrm>
-            <a:off x="5622829" y="2454485"/>
-            <a:ext cx="1219200" cy="1219200"/>
-          </a:xfrm>
-          <a:prstGeom prst="rect">
-            <a:avLst/>
-          </a:prstGeom>
-        </p:spPr>
-      </p:pic>
-      <p:pic>
-        <p:nvPicPr>
-          <p:cNvPr id="293" name="Picture 292"/>
-          <p:cNvPicPr>
-            <a:picLocks noChangeAspect="1"/>
-          </p:cNvPicPr>
-          <p:nvPr/>
-        </p:nvPicPr>
-        <p:blipFill>
-          <a:blip r:embed="rId20">
-            <a:lum bright="70000" contrast="-70000"/>
-            <a:extLst>
-              <a:ext uri="{28A0092B-C50C-407E-A947-70E740481C1C}">
-                <a14:useLocalDpi xmlns:a14="http://schemas.microsoft.com/office/drawing/2010/main" val="0"/>
-              </a:ext>
-            </a:extLst>
-          </a:blip>
-          <a:stretch>
-            <a:fillRect/>
-          </a:stretch>
-        </p:blipFill>
-        <p:spPr>
-          <a:xfrm>
-            <a:off x="8336400" y="2534314"/>
-            <a:ext cx="1219200" cy="1219200"/>
-          </a:xfrm>
-          <a:prstGeom prst="rect">
-            <a:avLst/>
-          </a:prstGeom>
-        </p:spPr>
-      </p:pic>
-      <p:pic>
-        <p:nvPicPr>
-          <p:cNvPr id="294" name="Picture 293"/>
-          <p:cNvPicPr>
-            <a:picLocks noChangeAspect="1"/>
-          </p:cNvPicPr>
-          <p:nvPr/>
-        </p:nvPicPr>
-        <p:blipFill>
-          <a:blip r:embed="rId21">
-            <a:lum bright="70000" contrast="-70000"/>
-            <a:extLst>
-              <a:ext uri="{28A0092B-C50C-407E-A947-70E740481C1C}">
-                <a14:useLocalDpi xmlns:a14="http://schemas.microsoft.com/office/drawing/2010/main" val="0"/>
-              </a:ext>
-            </a:extLst>
-          </a:blip>
-          <a:stretch>
-            <a:fillRect/>
-          </a:stretch>
-        </p:blipFill>
-        <p:spPr>
-          <a:xfrm>
-            <a:off x="1522829" y="3910656"/>
-            <a:ext cx="1219200" cy="1219200"/>
-          </a:xfrm>
-          <a:prstGeom prst="rect">
-            <a:avLst/>
-          </a:prstGeom>
-        </p:spPr>
-      </p:pic>
-      <p:pic>
-        <p:nvPicPr>
-          <p:cNvPr id="295" name="Picture 294"/>
-          <p:cNvPicPr>
-            <a:picLocks noChangeAspect="1"/>
-          </p:cNvPicPr>
-          <p:nvPr/>
-        </p:nvPicPr>
-        <p:blipFill>
-          <a:blip r:embed="rId22">
-            <a:lum bright="70000" contrast="-70000"/>
-            <a:extLst>
-              <a:ext uri="{28A0092B-C50C-407E-A947-70E740481C1C}">
-                <a14:useLocalDpi xmlns:a14="http://schemas.microsoft.com/office/drawing/2010/main" val="0"/>
-              </a:ext>
-            </a:extLst>
-          </a:blip>
-          <a:stretch>
-            <a:fillRect/>
-          </a:stretch>
-        </p:blipFill>
-        <p:spPr>
-          <a:xfrm>
-            <a:off x="303629" y="4021971"/>
-            <a:ext cx="1219200" cy="1219200"/>
-          </a:xfrm>
-          <a:prstGeom prst="rect">
-            <a:avLst/>
-          </a:prstGeom>
-        </p:spPr>
-      </p:pic>
-      <p:pic>
-        <p:nvPicPr>
-          <p:cNvPr id="296" name="Picture 295"/>
-          <p:cNvPicPr>
-            <a:picLocks noChangeAspect="1"/>
-          </p:cNvPicPr>
-          <p:nvPr/>
-        </p:nvPicPr>
-        <p:blipFill>
-          <a:blip r:embed="rId23">
-            <a:lum bright="70000" contrast="-70000"/>
-            <a:extLst>
-              <a:ext uri="{28A0092B-C50C-407E-A947-70E740481C1C}">
-                <a14:useLocalDpi xmlns:a14="http://schemas.microsoft.com/office/drawing/2010/main" val="0"/>
-              </a:ext>
-            </a:extLst>
-          </a:blip>
-          <a:stretch>
-            <a:fillRect/>
-          </a:stretch>
-        </p:blipFill>
-        <p:spPr>
-          <a:xfrm>
-            <a:off x="9762315" y="2534314"/>
-            <a:ext cx="1219200" cy="1219200"/>
-          </a:xfrm>
-          <a:prstGeom prst="rect">
-            <a:avLst/>
-          </a:prstGeom>
-        </p:spPr>
-      </p:pic>
-      <p:pic>
-        <p:nvPicPr>
-          <p:cNvPr id="297" name="Picture 296"/>
-          <p:cNvPicPr>
-            <a:picLocks noChangeAspect="1"/>
-          </p:cNvPicPr>
-          <p:nvPr/>
-        </p:nvPicPr>
-        <p:blipFill>
-          <a:blip r:embed="rId24">
-            <a:lum bright="70000" contrast="-70000"/>
-            <a:extLst>
-              <a:ext uri="{28A0092B-C50C-407E-A947-70E740481C1C}">
-                <a14:useLocalDpi xmlns:a14="http://schemas.microsoft.com/office/drawing/2010/main" val="0"/>
-              </a:ext>
-            </a:extLst>
-          </a:blip>
-          <a:stretch>
-            <a:fillRect/>
-          </a:stretch>
-        </p:blipFill>
-        <p:spPr>
-          <a:xfrm>
-            <a:off x="5998771" y="4004171"/>
-            <a:ext cx="1219200" cy="1219200"/>
-          </a:xfrm>
-          <a:prstGeom prst="rect">
-            <a:avLst/>
-          </a:prstGeom>
-        </p:spPr>
-      </p:pic>
-      <p:pic>
-        <p:nvPicPr>
-          <p:cNvPr id="298" name="Picture 297"/>
-          <p:cNvPicPr>
-            <a:picLocks noChangeAspect="1"/>
-          </p:cNvPicPr>
-          <p:nvPr/>
-        </p:nvPicPr>
-        <p:blipFill>
-          <a:blip r:embed="rId25">
-            <a:lum bright="70000" contrast="-70000"/>
-            <a:extLst>
-              <a:ext uri="{28A0092B-C50C-407E-A947-70E740481C1C}">
-                <a14:useLocalDpi xmlns:a14="http://schemas.microsoft.com/office/drawing/2010/main" val="0"/>
-              </a:ext>
-            </a:extLst>
-          </a:blip>
-          <a:stretch>
-            <a:fillRect/>
-          </a:stretch>
-        </p:blipFill>
-        <p:spPr>
-          <a:xfrm>
-            <a:off x="4526400" y="4021971"/>
-            <a:ext cx="1219200" cy="1219200"/>
-          </a:xfrm>
-          <a:prstGeom prst="rect">
-            <a:avLst/>
-          </a:prstGeom>
-        </p:spPr>
-      </p:pic>
-      <p:pic>
-        <p:nvPicPr>
-          <p:cNvPr id="299" name="Picture 298"/>
-          <p:cNvPicPr>
-            <a:picLocks noChangeAspect="1"/>
-          </p:cNvPicPr>
-          <p:nvPr/>
-        </p:nvPicPr>
-        <p:blipFill>
-          <a:blip r:embed="rId26">
-            <a:lum bright="70000" contrast="-70000"/>
-            <a:extLst>
-              <a:ext uri="{28A0092B-C50C-407E-A947-70E740481C1C}">
-                <a14:useLocalDpi xmlns:a14="http://schemas.microsoft.com/office/drawing/2010/main" val="0"/>
-              </a:ext>
-            </a:extLst>
-          </a:blip>
-          <a:stretch>
-            <a:fillRect/>
-          </a:stretch>
-        </p:blipFill>
-        <p:spPr>
-          <a:xfrm>
-            <a:off x="3054029" y="4021971"/>
-            <a:ext cx="1219200" cy="1219200"/>
-          </a:xfrm>
-          <a:prstGeom prst="rect">
-            <a:avLst/>
-          </a:prstGeom>
-        </p:spPr>
-      </p:pic>
-      <p:pic>
-        <p:nvPicPr>
-          <p:cNvPr id="300" name="Picture 299"/>
-          <p:cNvPicPr>
-            <a:picLocks noChangeAspect="1"/>
-          </p:cNvPicPr>
-          <p:nvPr/>
-        </p:nvPicPr>
-        <p:blipFill>
-          <a:blip r:embed="rId27">
-            <a:lum bright="70000" contrast="-70000"/>
-            <a:extLst>
-              <a:ext uri="{28A0092B-C50C-407E-A947-70E740481C1C}">
-                <a14:useLocalDpi xmlns:a14="http://schemas.microsoft.com/office/drawing/2010/main" val="0"/>
-              </a:ext>
-            </a:extLst>
-          </a:blip>
-          <a:stretch>
-            <a:fillRect/>
-          </a:stretch>
-        </p:blipFill>
-        <p:spPr>
-          <a:xfrm>
-            <a:off x="10221542" y="4145971"/>
-            <a:ext cx="1219200" cy="1219200"/>
-          </a:xfrm>
-          <a:prstGeom prst="rect">
-            <a:avLst/>
-          </a:prstGeom>
-        </p:spPr>
-      </p:pic>
-      <p:pic>
-        <p:nvPicPr>
-          <p:cNvPr id="301" name="Picture 300"/>
-          <p:cNvPicPr>
-            <a:picLocks noChangeAspect="1"/>
-          </p:cNvPicPr>
-          <p:nvPr/>
-        </p:nvPicPr>
-        <p:blipFill>
-          <a:blip r:embed="rId28">
-            <a:lum bright="70000" contrast="-70000"/>
-            <a:extLst>
-              <a:ext uri="{28A0092B-C50C-407E-A947-70E740481C1C}">
-                <a14:useLocalDpi xmlns:a14="http://schemas.microsoft.com/office/drawing/2010/main" val="0"/>
-              </a:ext>
-            </a:extLst>
-          </a:blip>
-          <a:stretch>
-            <a:fillRect/>
-          </a:stretch>
-        </p:blipFill>
-        <p:spPr>
-          <a:xfrm>
-            <a:off x="8858971" y="4120114"/>
-            <a:ext cx="1219200" cy="1219200"/>
-          </a:xfrm>
-          <a:prstGeom prst="rect">
-            <a:avLst/>
-          </a:prstGeom>
-        </p:spPr>
-      </p:pic>
-      <p:pic>
-        <p:nvPicPr>
-          <p:cNvPr id="302" name="Picture 301"/>
-          <p:cNvPicPr>
-            <a:picLocks noChangeAspect="1"/>
-          </p:cNvPicPr>
-          <p:nvPr/>
-        </p:nvPicPr>
-        <p:blipFill>
-          <a:blip r:embed="rId29">
-            <a:lum bright="70000" contrast="-70000"/>
-            <a:extLst>
-              <a:ext uri="{28A0092B-C50C-407E-A947-70E740481C1C}">
-                <a14:useLocalDpi xmlns:a14="http://schemas.microsoft.com/office/drawing/2010/main" val="0"/>
-              </a:ext>
-            </a:extLst>
-          </a:blip>
-          <a:stretch>
-            <a:fillRect/>
-          </a:stretch>
-        </p:blipFill>
-        <p:spPr>
-          <a:xfrm>
-            <a:off x="7471142" y="4120114"/>
-            <a:ext cx="1219200" cy="1219200"/>
-          </a:xfrm>
-          <a:prstGeom prst="rect">
-            <a:avLst/>
-          </a:prstGeom>
-        </p:spPr>
-      </p:pic>
-    </p:spTree>
-    <p:extLst>
-      <p:ext uri="{BB962C8B-B14F-4D97-AF65-F5344CB8AC3E}">
-        <p14:creationId xmlns:p14="http://schemas.microsoft.com/office/powerpoint/2010/main" val="2451305448"/>
-      </p:ext>
-    </p:extLst>
-  </p:cSld>
-  <p:clrMapOvr>
-    <a:masterClrMapping/>
-  </p:clrMapOvr>
-</p:sld>
-</file>
-
 <file path=ppt/slides/slide34.xml><?xml version="1.0" encoding="utf-8"?>
 <p:sld xmlns:a="http://schemas.openxmlformats.org/drawingml/2006/main" xmlns:r="http://schemas.openxmlformats.org/officeDocument/2006/relationships" xmlns:p="http://schemas.openxmlformats.org/presentationml/2006/main" show="0">
   <p:cSld>
@@ -11606,7 +10980,7 @@
       </p:grpSpPr>
       <p:pic>
         <p:nvPicPr>
-          <p:cNvPr id="2" name="Picture 1"/>
+          <p:cNvPr id="11" name="Picture 10"/>
           <p:cNvPicPr>
             <a:picLocks noChangeAspect="1"/>
           </p:cNvPicPr>
@@ -11614,30 +10988,29 @@
         </p:nvPicPr>
         <p:blipFill>
           <a:blip r:embed="rId2">
-            <a:lum bright="70000" contrast="-70000"/>
-            <a:extLst>
-              <a:ext uri="{28A0092B-C50C-407E-A947-70E740481C1C}">
-                <a14:useLocalDpi xmlns:a14="http://schemas.microsoft.com/office/drawing/2010/main" val="0"/>
-              </a:ext>
-            </a:extLst>
-          </a:blip>
-          <a:stretch>
-            <a:fillRect/>
-          </a:stretch>
-        </p:blipFill>
-        <p:spPr>
-          <a:xfrm>
-            <a:off x="322686" y="250829"/>
-            <a:ext cx="1219200" cy="1219200"/>
-          </a:xfrm>
-          <a:prstGeom prst="rect">
-            <a:avLst/>
-          </a:prstGeom>
-        </p:spPr>
-      </p:pic>
-      <p:pic>
-        <p:nvPicPr>
-          <p:cNvPr id="3" name="Picture 2"/>
+            <a:extLst>
+              <a:ext uri="{28A0092B-C50C-407E-A947-70E740481C1C}">
+                <a14:useLocalDpi xmlns:a14="http://schemas.microsoft.com/office/drawing/2010/main" val="0"/>
+              </a:ext>
+            </a:extLst>
+          </a:blip>
+          <a:stretch>
+            <a:fillRect/>
+          </a:stretch>
+        </p:blipFill>
+        <p:spPr>
+          <a:xfrm>
+            <a:off x="2207458" y="453313"/>
+            <a:ext cx="457200" cy="457200"/>
+          </a:xfrm>
+          <a:prstGeom prst="rect">
+            <a:avLst/>
+          </a:prstGeom>
+        </p:spPr>
+      </p:pic>
+      <p:pic>
+        <p:nvPicPr>
+          <p:cNvPr id="12" name="Picture 11"/>
           <p:cNvPicPr>
             <a:picLocks noChangeAspect="1"/>
           </p:cNvPicPr>
@@ -11645,30 +11018,29 @@
         </p:nvPicPr>
         <p:blipFill>
           <a:blip r:embed="rId3">
-            <a:lum bright="70000" contrast="-70000"/>
-            <a:extLst>
-              <a:ext uri="{28A0092B-C50C-407E-A947-70E740481C1C}">
-                <a14:useLocalDpi xmlns:a14="http://schemas.microsoft.com/office/drawing/2010/main" val="0"/>
-              </a:ext>
-            </a:extLst>
-          </a:blip>
-          <a:stretch>
-            <a:fillRect/>
-          </a:stretch>
-        </p:blipFill>
-        <p:spPr>
-          <a:xfrm>
-            <a:off x="1841371" y="306486"/>
-            <a:ext cx="1219200" cy="1219200"/>
-          </a:xfrm>
-          <a:prstGeom prst="rect">
-            <a:avLst/>
-          </a:prstGeom>
-        </p:spPr>
-      </p:pic>
-      <p:pic>
-        <p:nvPicPr>
-          <p:cNvPr id="4" name="Picture 3"/>
+            <a:extLst>
+              <a:ext uri="{28A0092B-C50C-407E-A947-70E740481C1C}">
+                <a14:useLocalDpi xmlns:a14="http://schemas.microsoft.com/office/drawing/2010/main" val="0"/>
+              </a:ext>
+            </a:extLst>
+          </a:blip>
+          <a:stretch>
+            <a:fillRect/>
+          </a:stretch>
+        </p:blipFill>
+        <p:spPr>
+          <a:xfrm>
+            <a:off x="1294229" y="453399"/>
+            <a:ext cx="457200" cy="457200"/>
+          </a:xfrm>
+          <a:prstGeom prst="rect">
+            <a:avLst/>
+          </a:prstGeom>
+        </p:spPr>
+      </p:pic>
+      <p:pic>
+        <p:nvPicPr>
+          <p:cNvPr id="13" name="Picture 12"/>
           <p:cNvPicPr>
             <a:picLocks noChangeAspect="1"/>
           </p:cNvPicPr>
@@ -11676,30 +11048,29 @@
         </p:nvPicPr>
         <p:blipFill>
           <a:blip r:embed="rId4">
-            <a:lum bright="70000" contrast="-70000"/>
-            <a:extLst>
-              <a:ext uri="{28A0092B-C50C-407E-A947-70E740481C1C}">
-                <a14:useLocalDpi xmlns:a14="http://schemas.microsoft.com/office/drawing/2010/main" val="0"/>
-              </a:ext>
-            </a:extLst>
-          </a:blip>
-          <a:stretch>
-            <a:fillRect/>
-          </a:stretch>
-        </p:blipFill>
-        <p:spPr>
-          <a:xfrm>
-            <a:off x="3360056" y="250829"/>
-            <a:ext cx="1219200" cy="1219200"/>
-          </a:xfrm>
-          <a:prstGeom prst="rect">
-            <a:avLst/>
-          </a:prstGeom>
-        </p:spPr>
-      </p:pic>
-      <p:pic>
-        <p:nvPicPr>
-          <p:cNvPr id="5" name="Picture 4"/>
+            <a:extLst>
+              <a:ext uri="{28A0092B-C50C-407E-A947-70E740481C1C}">
+                <a14:useLocalDpi xmlns:a14="http://schemas.microsoft.com/office/drawing/2010/main" val="0"/>
+              </a:ext>
+            </a:extLst>
+          </a:blip>
+          <a:stretch>
+            <a:fillRect/>
+          </a:stretch>
+        </p:blipFill>
+        <p:spPr>
+          <a:xfrm>
+            <a:off x="381000" y="453399"/>
+            <a:ext cx="457200" cy="457200"/>
+          </a:xfrm>
+          <a:prstGeom prst="rect">
+            <a:avLst/>
+          </a:prstGeom>
+        </p:spPr>
+      </p:pic>
+      <p:pic>
+        <p:nvPicPr>
+          <p:cNvPr id="15" name="Picture 14"/>
           <p:cNvPicPr>
             <a:picLocks noChangeAspect="1"/>
           </p:cNvPicPr>
@@ -11720,17 +11091,17 @@
         </p:blipFill>
         <p:spPr>
           <a:xfrm>
-            <a:off x="4878741" y="249715"/>
-            <a:ext cx="1219200" cy="1219200"/>
-          </a:xfrm>
-          <a:prstGeom prst="rect">
-            <a:avLst/>
-          </a:prstGeom>
-        </p:spPr>
-      </p:pic>
-      <p:pic>
-        <p:nvPicPr>
-          <p:cNvPr id="6" name="Picture 5"/>
+            <a:off x="303629" y="1070428"/>
+            <a:ext cx="1219200" cy="1219200"/>
+          </a:xfrm>
+          <a:prstGeom prst="rect">
+            <a:avLst/>
+          </a:prstGeom>
+        </p:spPr>
+      </p:pic>
+      <p:pic>
+        <p:nvPicPr>
+          <p:cNvPr id="279" name="Picture 278"/>
           <p:cNvPicPr>
             <a:picLocks noChangeAspect="1"/>
           </p:cNvPicPr>
@@ -11751,17 +11122,17 @@
         </p:blipFill>
         <p:spPr>
           <a:xfrm>
-            <a:off x="7736400" y="249715"/>
-            <a:ext cx="1219200" cy="1219200"/>
-          </a:xfrm>
-          <a:prstGeom prst="rect">
-            <a:avLst/>
-          </a:prstGeom>
-        </p:spPr>
-      </p:pic>
-      <p:pic>
-        <p:nvPicPr>
-          <p:cNvPr id="7" name="Picture 6"/>
+            <a:off x="2950029" y="1070428"/>
+            <a:ext cx="1219200" cy="1219200"/>
+          </a:xfrm>
+          <a:prstGeom prst="rect">
+            <a:avLst/>
+          </a:prstGeom>
+        </p:spPr>
+      </p:pic>
+      <p:pic>
+        <p:nvPicPr>
+          <p:cNvPr id="280" name="Picture 279"/>
           <p:cNvPicPr>
             <a:picLocks noChangeAspect="1"/>
           </p:cNvPicPr>
@@ -11782,17 +11153,17 @@
         </p:blipFill>
         <p:spPr>
           <a:xfrm>
-            <a:off x="6396057" y="249715"/>
-            <a:ext cx="1219200" cy="1219200"/>
-          </a:xfrm>
-          <a:prstGeom prst="rect">
-            <a:avLst/>
-          </a:prstGeom>
-        </p:spPr>
-      </p:pic>
-      <p:pic>
-        <p:nvPicPr>
-          <p:cNvPr id="8" name="Picture 7"/>
+            <a:off x="1626829" y="1070428"/>
+            <a:ext cx="1219200" cy="1219200"/>
+          </a:xfrm>
+          <a:prstGeom prst="rect">
+            <a:avLst/>
+          </a:prstGeom>
+        </p:spPr>
+      </p:pic>
+      <p:pic>
+        <p:nvPicPr>
+          <p:cNvPr id="281" name="Picture 280"/>
           <p:cNvPicPr>
             <a:picLocks noChangeAspect="1"/>
           </p:cNvPicPr>
@@ -11813,17 +11184,17 @@
         </p:blipFill>
         <p:spPr>
           <a:xfrm>
-            <a:off x="322686" y="1525686"/>
-            <a:ext cx="1219200" cy="1219200"/>
-          </a:xfrm>
-          <a:prstGeom prst="rect">
-            <a:avLst/>
-          </a:prstGeom>
-        </p:spPr>
-      </p:pic>
-      <p:pic>
-        <p:nvPicPr>
-          <p:cNvPr id="9" name="Picture 8"/>
+            <a:off x="5596429" y="1107999"/>
+            <a:ext cx="1219200" cy="1219200"/>
+          </a:xfrm>
+          <a:prstGeom prst="rect">
+            <a:avLst/>
+          </a:prstGeom>
+        </p:spPr>
+      </p:pic>
+      <p:pic>
+        <p:nvPicPr>
+          <p:cNvPr id="282" name="Picture 281"/>
           <p:cNvPicPr>
             <a:picLocks noChangeAspect="1"/>
           </p:cNvPicPr>
@@ -11844,17 +11215,17 @@
         </p:blipFill>
         <p:spPr>
           <a:xfrm>
-            <a:off x="9120229" y="275315"/>
-            <a:ext cx="1219200" cy="1219200"/>
-          </a:xfrm>
-          <a:prstGeom prst="rect">
-            <a:avLst/>
-          </a:prstGeom>
-        </p:spPr>
-      </p:pic>
-      <p:pic>
-        <p:nvPicPr>
-          <p:cNvPr id="10" name="Picture 9"/>
+            <a:off x="4273229" y="1070428"/>
+            <a:ext cx="1219200" cy="1219200"/>
+          </a:xfrm>
+          <a:prstGeom prst="rect">
+            <a:avLst/>
+          </a:prstGeom>
+        </p:spPr>
+      </p:pic>
+      <p:pic>
+        <p:nvPicPr>
+          <p:cNvPr id="283" name="Picture 282"/>
           <p:cNvPicPr>
             <a:picLocks noChangeAspect="1"/>
           </p:cNvPicPr>
@@ -11875,17 +11246,17 @@
         </p:blipFill>
         <p:spPr>
           <a:xfrm>
-            <a:off x="10460572" y="306486"/>
-            <a:ext cx="1219200" cy="1219200"/>
-          </a:xfrm>
-          <a:prstGeom prst="rect">
-            <a:avLst/>
-          </a:prstGeom>
-        </p:spPr>
-      </p:pic>
-      <p:pic>
-        <p:nvPicPr>
-          <p:cNvPr id="11" name="Picture 10"/>
+            <a:off x="6919629" y="1107999"/>
+            <a:ext cx="1219200" cy="1219200"/>
+          </a:xfrm>
+          <a:prstGeom prst="rect">
+            <a:avLst/>
+          </a:prstGeom>
+        </p:spPr>
+      </p:pic>
+      <p:pic>
+        <p:nvPicPr>
+          <p:cNvPr id="284" name="Picture 283"/>
           <p:cNvPicPr>
             <a:picLocks noChangeAspect="1"/>
           </p:cNvPicPr>
@@ -11906,17 +11277,17 @@
         </p:blipFill>
         <p:spPr>
           <a:xfrm>
-            <a:off x="3179485" y="1494515"/>
-            <a:ext cx="1219200" cy="1219200"/>
-          </a:xfrm>
-          <a:prstGeom prst="rect">
-            <a:avLst/>
-          </a:prstGeom>
-        </p:spPr>
-      </p:pic>
-      <p:pic>
-        <p:nvPicPr>
-          <p:cNvPr id="12" name="Picture 11"/>
+            <a:off x="9105600" y="1070428"/>
+            <a:ext cx="1219200" cy="1219200"/>
+          </a:xfrm>
+          <a:prstGeom prst="rect">
+            <a:avLst/>
+          </a:prstGeom>
+        </p:spPr>
+      </p:pic>
+      <p:pic>
+        <p:nvPicPr>
+          <p:cNvPr id="285" name="Picture 284"/>
           <p:cNvPicPr>
             <a:picLocks noChangeAspect="1"/>
           </p:cNvPicPr>
@@ -11937,17 +11308,17 @@
         </p:blipFill>
         <p:spPr>
           <a:xfrm>
-            <a:off x="1841371" y="1525686"/>
-            <a:ext cx="1219200" cy="1219200"/>
-          </a:xfrm>
-          <a:prstGeom prst="rect">
-            <a:avLst/>
-          </a:prstGeom>
-        </p:spPr>
-      </p:pic>
-      <p:pic>
-        <p:nvPicPr>
-          <p:cNvPr id="13" name="Picture 12"/>
+            <a:off x="7988286" y="1070428"/>
+            <a:ext cx="1219200" cy="1219200"/>
+          </a:xfrm>
+          <a:prstGeom prst="rect">
+            <a:avLst/>
+          </a:prstGeom>
+        </p:spPr>
+      </p:pic>
+      <p:pic>
+        <p:nvPicPr>
+          <p:cNvPr id="286" name="Picture 285"/>
           <p:cNvPicPr>
             <a:picLocks noChangeAspect="1"/>
           </p:cNvPicPr>
@@ -11968,17 +11339,17 @@
         </p:blipFill>
         <p:spPr>
           <a:xfrm>
-            <a:off x="4728943" y="1468915"/>
-            <a:ext cx="1219200" cy="1219200"/>
-          </a:xfrm>
-          <a:prstGeom prst="rect">
-            <a:avLst/>
-          </a:prstGeom>
-        </p:spPr>
-      </p:pic>
-      <p:pic>
-        <p:nvPicPr>
-          <p:cNvPr id="14" name="Picture 13"/>
+            <a:off x="303629" y="2185742"/>
+            <a:ext cx="1219200" cy="1219200"/>
+          </a:xfrm>
+          <a:prstGeom prst="rect">
+            <a:avLst/>
+          </a:prstGeom>
+        </p:spPr>
+      </p:pic>
+      <p:pic>
+        <p:nvPicPr>
+          <p:cNvPr id="287" name="Picture 286"/>
           <p:cNvPicPr>
             <a:picLocks noChangeAspect="1"/>
           </p:cNvPicPr>
@@ -11999,17 +11370,17 @@
         </p:blipFill>
         <p:spPr>
           <a:xfrm>
-            <a:off x="7809086" y="1525686"/>
-            <a:ext cx="1219200" cy="1219200"/>
-          </a:xfrm>
-          <a:prstGeom prst="rect">
-            <a:avLst/>
-          </a:prstGeom>
-        </p:spPr>
-      </p:pic>
-      <p:pic>
-        <p:nvPicPr>
-          <p:cNvPr id="15" name="Picture 14"/>
+            <a:off x="10484143" y="1070428"/>
+            <a:ext cx="1219200" cy="1219200"/>
+          </a:xfrm>
+          <a:prstGeom prst="rect">
+            <a:avLst/>
+          </a:prstGeom>
+        </p:spPr>
+      </p:pic>
+      <p:pic>
+        <p:nvPicPr>
+          <p:cNvPr id="288" name="Picture 287"/>
           <p:cNvPicPr>
             <a:picLocks noChangeAspect="1"/>
           </p:cNvPicPr>
@@ -12030,17 +11401,17 @@
         </p:blipFill>
         <p:spPr>
           <a:xfrm>
-            <a:off x="6376800" y="1525686"/>
-            <a:ext cx="1219200" cy="1219200"/>
-          </a:xfrm>
-          <a:prstGeom prst="rect">
-            <a:avLst/>
-          </a:prstGeom>
-        </p:spPr>
-      </p:pic>
-      <p:pic>
-        <p:nvPicPr>
-          <p:cNvPr id="16" name="Picture 15"/>
+            <a:off x="2923629" y="2421599"/>
+            <a:ext cx="1219200" cy="1219200"/>
+          </a:xfrm>
+          <a:prstGeom prst="rect">
+            <a:avLst/>
+          </a:prstGeom>
+        </p:spPr>
+      </p:pic>
+      <p:pic>
+        <p:nvPicPr>
+          <p:cNvPr id="289" name="Picture 288"/>
           <p:cNvPicPr>
             <a:picLocks noChangeAspect="1"/>
           </p:cNvPicPr>
@@ -12061,17 +11432,17 @@
         </p:blipFill>
         <p:spPr>
           <a:xfrm>
-            <a:off x="9237900" y="1525686"/>
-            <a:ext cx="1219200" cy="1219200"/>
-          </a:xfrm>
-          <a:prstGeom prst="rect">
-            <a:avLst/>
-          </a:prstGeom>
-        </p:spPr>
-      </p:pic>
-      <p:pic>
-        <p:nvPicPr>
-          <p:cNvPr id="17" name="Picture 16"/>
+            <a:off x="4273229" y="2454485"/>
+            <a:ext cx="1219200" cy="1219200"/>
+          </a:xfrm>
+          <a:prstGeom prst="rect">
+            <a:avLst/>
+          </a:prstGeom>
+        </p:spPr>
+      </p:pic>
+      <p:pic>
+        <p:nvPicPr>
+          <p:cNvPr id="290" name="Picture 289"/>
           <p:cNvPicPr>
             <a:picLocks noChangeAspect="1"/>
           </p:cNvPicPr>
@@ -12092,17 +11463,17 @@
         </p:blipFill>
         <p:spPr>
           <a:xfrm>
-            <a:off x="10404571" y="1519943"/>
-            <a:ext cx="1219200" cy="1219200"/>
-          </a:xfrm>
-          <a:prstGeom prst="rect">
-            <a:avLst/>
-          </a:prstGeom>
-        </p:spPr>
-      </p:pic>
-      <p:pic>
-        <p:nvPicPr>
-          <p:cNvPr id="18" name="Picture 17"/>
+            <a:off x="1704429" y="2421599"/>
+            <a:ext cx="1219200" cy="1219200"/>
+          </a:xfrm>
+          <a:prstGeom prst="rect">
+            <a:avLst/>
+          </a:prstGeom>
+        </p:spPr>
+      </p:pic>
+      <p:pic>
+        <p:nvPicPr>
+          <p:cNvPr id="291" name="Picture 290"/>
           <p:cNvPicPr>
             <a:picLocks noChangeAspect="1"/>
           </p:cNvPicPr>
@@ -12123,17 +11494,17 @@
         </p:blipFill>
         <p:spPr>
           <a:xfrm>
-            <a:off x="1841371" y="3030143"/>
-            <a:ext cx="1219200" cy="1219200"/>
-          </a:xfrm>
-          <a:prstGeom prst="rect">
-            <a:avLst/>
-          </a:prstGeom>
-        </p:spPr>
-      </p:pic>
-      <p:pic>
-        <p:nvPicPr>
-          <p:cNvPr id="19" name="Picture 18"/>
+            <a:off x="6976800" y="2439628"/>
+            <a:ext cx="1219200" cy="1219200"/>
+          </a:xfrm>
+          <a:prstGeom prst="rect">
+            <a:avLst/>
+          </a:prstGeom>
+        </p:spPr>
+      </p:pic>
+      <p:pic>
+        <p:nvPicPr>
+          <p:cNvPr id="292" name="Picture 291"/>
           <p:cNvPicPr>
             <a:picLocks noChangeAspect="1"/>
           </p:cNvPicPr>
@@ -12154,17 +11525,17 @@
         </p:blipFill>
         <p:spPr>
           <a:xfrm>
-            <a:off x="322686" y="3030143"/>
-            <a:ext cx="1219200" cy="1219200"/>
-          </a:xfrm>
-          <a:prstGeom prst="rect">
-            <a:avLst/>
-          </a:prstGeom>
-        </p:spPr>
-      </p:pic>
-      <p:pic>
-        <p:nvPicPr>
-          <p:cNvPr id="20" name="Picture 19"/>
+            <a:off x="5622829" y="2454485"/>
+            <a:ext cx="1219200" cy="1219200"/>
+          </a:xfrm>
+          <a:prstGeom prst="rect">
+            <a:avLst/>
+          </a:prstGeom>
+        </p:spPr>
+      </p:pic>
+      <p:pic>
+        <p:nvPicPr>
+          <p:cNvPr id="293" name="Picture 292"/>
           <p:cNvPicPr>
             <a:picLocks noChangeAspect="1"/>
           </p:cNvPicPr>
@@ -12185,17 +11556,17 @@
         </p:blipFill>
         <p:spPr>
           <a:xfrm>
-            <a:off x="4728943" y="3030143"/>
-            <a:ext cx="1219200" cy="1219200"/>
-          </a:xfrm>
-          <a:prstGeom prst="rect">
-            <a:avLst/>
-          </a:prstGeom>
-        </p:spPr>
-      </p:pic>
-      <p:pic>
-        <p:nvPicPr>
-          <p:cNvPr id="21" name="Picture 20"/>
+            <a:off x="8336400" y="2534314"/>
+            <a:ext cx="1219200" cy="1219200"/>
+          </a:xfrm>
+          <a:prstGeom prst="rect">
+            <a:avLst/>
+          </a:prstGeom>
+        </p:spPr>
+      </p:pic>
+      <p:pic>
+        <p:nvPicPr>
+          <p:cNvPr id="294" name="Picture 293"/>
           <p:cNvPicPr>
             <a:picLocks noChangeAspect="1"/>
           </p:cNvPicPr>
@@ -12216,17 +11587,17 @@
         </p:blipFill>
         <p:spPr>
           <a:xfrm>
-            <a:off x="3338570" y="3030143"/>
-            <a:ext cx="1219200" cy="1219200"/>
-          </a:xfrm>
-          <a:prstGeom prst="rect">
-            <a:avLst/>
-          </a:prstGeom>
-        </p:spPr>
-      </p:pic>
-      <p:pic>
-        <p:nvPicPr>
-          <p:cNvPr id="22" name="Picture 21"/>
+            <a:off x="1522829" y="3910656"/>
+            <a:ext cx="1219200" cy="1219200"/>
+          </a:xfrm>
+          <a:prstGeom prst="rect">
+            <a:avLst/>
+          </a:prstGeom>
+        </p:spPr>
+      </p:pic>
+      <p:pic>
+        <p:nvPicPr>
+          <p:cNvPr id="295" name="Picture 294"/>
           <p:cNvPicPr>
             <a:picLocks noChangeAspect="1"/>
           </p:cNvPicPr>
@@ -12247,17 +11618,17 @@
         </p:blipFill>
         <p:spPr>
           <a:xfrm>
-            <a:off x="1835343" y="4534600"/>
-            <a:ext cx="1219200" cy="1219200"/>
-          </a:xfrm>
-          <a:prstGeom prst="rect">
-            <a:avLst/>
-          </a:prstGeom>
-        </p:spPr>
-      </p:pic>
-      <p:pic>
-        <p:nvPicPr>
-          <p:cNvPr id="23" name="Picture 22"/>
+            <a:off x="303629" y="4021971"/>
+            <a:ext cx="1219200" cy="1219200"/>
+          </a:xfrm>
+          <a:prstGeom prst="rect">
+            <a:avLst/>
+          </a:prstGeom>
+        </p:spPr>
+      </p:pic>
+      <p:pic>
+        <p:nvPicPr>
+          <p:cNvPr id="296" name="Picture 295"/>
           <p:cNvPicPr>
             <a:picLocks noChangeAspect="1"/>
           </p:cNvPicPr>
@@ -12278,17 +11649,17 @@
         </p:blipFill>
         <p:spPr>
           <a:xfrm>
-            <a:off x="322686" y="4534600"/>
-            <a:ext cx="1219200" cy="1219200"/>
-          </a:xfrm>
-          <a:prstGeom prst="rect">
-            <a:avLst/>
-          </a:prstGeom>
-        </p:spPr>
-      </p:pic>
-      <p:pic>
-        <p:nvPicPr>
-          <p:cNvPr id="24" name="Picture 23"/>
+            <a:off x="9762315" y="2534314"/>
+            <a:ext cx="1219200" cy="1219200"/>
+          </a:xfrm>
+          <a:prstGeom prst="rect">
+            <a:avLst/>
+          </a:prstGeom>
+        </p:spPr>
+      </p:pic>
+      <p:pic>
+        <p:nvPicPr>
+          <p:cNvPr id="297" name="Picture 296"/>
           <p:cNvPicPr>
             <a:picLocks noChangeAspect="1"/>
           </p:cNvPicPr>
@@ -12309,17 +11680,17 @@
         </p:blipFill>
         <p:spPr>
           <a:xfrm>
-            <a:off x="6376800" y="3162943"/>
-            <a:ext cx="1219200" cy="1219200"/>
-          </a:xfrm>
-          <a:prstGeom prst="rect">
-            <a:avLst/>
-          </a:prstGeom>
-        </p:spPr>
-      </p:pic>
-      <p:pic>
-        <p:nvPicPr>
-          <p:cNvPr id="25" name="Picture 24"/>
+            <a:off x="5998771" y="4004171"/>
+            <a:ext cx="1219200" cy="1219200"/>
+          </a:xfrm>
+          <a:prstGeom prst="rect">
+            <a:avLst/>
+          </a:prstGeom>
+        </p:spPr>
+      </p:pic>
+      <p:pic>
+        <p:nvPicPr>
+          <p:cNvPr id="298" name="Picture 297"/>
           <p:cNvPicPr>
             <a:picLocks noChangeAspect="1"/>
           </p:cNvPicPr>
@@ -12340,17 +11711,17 @@
         </p:blipFill>
         <p:spPr>
           <a:xfrm>
-            <a:off x="10404571" y="3109800"/>
-            <a:ext cx="1219200" cy="1219200"/>
-          </a:xfrm>
-          <a:prstGeom prst="rect">
-            <a:avLst/>
-          </a:prstGeom>
-        </p:spPr>
-      </p:pic>
-      <p:pic>
-        <p:nvPicPr>
-          <p:cNvPr id="26" name="Picture 25"/>
+            <a:off x="4526400" y="4021971"/>
+            <a:ext cx="1219200" cy="1219200"/>
+          </a:xfrm>
+          <a:prstGeom prst="rect">
+            <a:avLst/>
+          </a:prstGeom>
+        </p:spPr>
+      </p:pic>
+      <p:pic>
+        <p:nvPicPr>
+          <p:cNvPr id="299" name="Picture 298"/>
           <p:cNvPicPr>
             <a:picLocks noChangeAspect="1"/>
           </p:cNvPicPr>
@@ -12371,17 +11742,17 @@
         </p:blipFill>
         <p:spPr>
           <a:xfrm>
-            <a:off x="3338570" y="4534600"/>
-            <a:ext cx="1219200" cy="1219200"/>
-          </a:xfrm>
-          <a:prstGeom prst="rect">
-            <a:avLst/>
-          </a:prstGeom>
-        </p:spPr>
-      </p:pic>
-      <p:pic>
-        <p:nvPicPr>
-          <p:cNvPr id="27" name="Picture 26"/>
+            <a:off x="3054029" y="4021971"/>
+            <a:ext cx="1219200" cy="1219200"/>
+          </a:xfrm>
+          <a:prstGeom prst="rect">
+            <a:avLst/>
+          </a:prstGeom>
+        </p:spPr>
+      </p:pic>
+      <p:pic>
+        <p:nvPicPr>
+          <p:cNvPr id="300" name="Picture 299"/>
           <p:cNvPicPr>
             <a:picLocks noChangeAspect="1"/>
           </p:cNvPicPr>
@@ -12402,17 +11773,17 @@
         </p:blipFill>
         <p:spPr>
           <a:xfrm>
-            <a:off x="4831171" y="4560286"/>
-            <a:ext cx="1219200" cy="1219200"/>
-          </a:xfrm>
-          <a:prstGeom prst="rect">
-            <a:avLst/>
-          </a:prstGeom>
-        </p:spPr>
-      </p:pic>
-      <p:pic>
-        <p:nvPicPr>
-          <p:cNvPr id="28" name="Picture 27"/>
+            <a:off x="10221542" y="4145971"/>
+            <a:ext cx="1219200" cy="1219200"/>
+          </a:xfrm>
+          <a:prstGeom prst="rect">
+            <a:avLst/>
+          </a:prstGeom>
+        </p:spPr>
+      </p:pic>
+      <p:pic>
+        <p:nvPicPr>
+          <p:cNvPr id="301" name="Picture 300"/>
           <p:cNvPicPr>
             <a:picLocks noChangeAspect="1"/>
           </p:cNvPicPr>
@@ -12433,17 +11804,17 @@
         </p:blipFill>
         <p:spPr>
           <a:xfrm>
-            <a:off x="9028286" y="4560286"/>
-            <a:ext cx="1219200" cy="1219200"/>
-          </a:xfrm>
-          <a:prstGeom prst="rect">
-            <a:avLst/>
-          </a:prstGeom>
-        </p:spPr>
-      </p:pic>
-      <p:pic>
-        <p:nvPicPr>
-          <p:cNvPr id="29" name="Picture 28"/>
+            <a:off x="8858971" y="4120114"/>
+            <a:ext cx="1219200" cy="1219200"/>
+          </a:xfrm>
+          <a:prstGeom prst="rect">
+            <a:avLst/>
+          </a:prstGeom>
+        </p:spPr>
+      </p:pic>
+      <p:pic>
+        <p:nvPicPr>
+          <p:cNvPr id="302" name="Picture 301"/>
           <p:cNvPicPr>
             <a:picLocks noChangeAspect="1"/>
           </p:cNvPicPr>
@@ -12464,38 +11835,7 @@
         </p:blipFill>
         <p:spPr>
           <a:xfrm>
-            <a:off x="8955600" y="3315400"/>
-            <a:ext cx="1219200" cy="1219200"/>
-          </a:xfrm>
-          <a:prstGeom prst="rect">
-            <a:avLst/>
-          </a:prstGeom>
-        </p:spPr>
-      </p:pic>
-      <p:pic>
-        <p:nvPicPr>
-          <p:cNvPr id="30" name="Picture 29"/>
-          <p:cNvPicPr>
-            <a:picLocks noChangeAspect="1"/>
-          </p:cNvPicPr>
-          <p:nvPr/>
-        </p:nvPicPr>
-        <p:blipFill>
-          <a:blip r:embed="rId30">
-            <a:lum bright="70000" contrast="-70000"/>
-            <a:extLst>
-              <a:ext uri="{28A0092B-C50C-407E-A947-70E740481C1C}">
-                <a14:useLocalDpi xmlns:a14="http://schemas.microsoft.com/office/drawing/2010/main" val="0"/>
-              </a:ext>
-            </a:extLst>
-          </a:blip>
-          <a:stretch>
-            <a:fillRect/>
-          </a:stretch>
-        </p:blipFill>
-        <p:spPr>
-          <a:xfrm>
-            <a:off x="10457100" y="4534600"/>
+            <a:off x="7471142" y="4120114"/>
             <a:ext cx="1219200" cy="1219200"/>
           </a:xfrm>
           <a:prstGeom prst="rect">
@@ -12506,7 +11846,7 @@
     </p:spTree>
     <p:extLst>
       <p:ext uri="{BB962C8B-B14F-4D97-AF65-F5344CB8AC3E}">
-        <p14:creationId xmlns:p14="http://schemas.microsoft.com/office/powerpoint/2010/main" val="823657930"/>
+        <p14:creationId xmlns:p14="http://schemas.microsoft.com/office/powerpoint/2010/main" val="2451305448"/>
       </p:ext>
     </p:extLst>
   </p:cSld>
@@ -12556,7 +11896,7 @@
         </p:blipFill>
         <p:spPr>
           <a:xfrm>
-            <a:off x="130628" y="359229"/>
+            <a:off x="322686" y="250829"/>
             <a:ext cx="1219200" cy="1219200"/>
           </a:xfrm>
           <a:prstGeom prst="rect">
@@ -12587,7 +11927,7 @@
         </p:blipFill>
         <p:spPr>
           <a:xfrm>
-            <a:off x="94399" y="4550571"/>
+            <a:off x="1841371" y="306486"/>
             <a:ext cx="1219200" cy="1219200"/>
           </a:xfrm>
           <a:prstGeom prst="rect">
@@ -12618,7 +11958,7 @@
         </p:blipFill>
         <p:spPr>
           <a:xfrm>
-            <a:off x="94399" y="3153457"/>
+            <a:off x="3360056" y="250829"/>
             <a:ext cx="1219200" cy="1219200"/>
           </a:xfrm>
           <a:prstGeom prst="rect">
@@ -12649,7 +11989,7 @@
         </p:blipFill>
         <p:spPr>
           <a:xfrm>
-            <a:off x="94399" y="1756343"/>
+            <a:off x="4878741" y="249715"/>
             <a:ext cx="1219200" cy="1219200"/>
           </a:xfrm>
           <a:prstGeom prst="rect">
@@ -12680,7 +12020,7 @@
         </p:blipFill>
         <p:spPr>
           <a:xfrm>
-            <a:off x="1652285" y="359229"/>
+            <a:off x="7736400" y="249715"/>
             <a:ext cx="1219200" cy="1219200"/>
           </a:xfrm>
           <a:prstGeom prst="rect">
@@ -12711,7 +12051,7 @@
         </p:blipFill>
         <p:spPr>
           <a:xfrm>
-            <a:off x="1652285" y="1756343"/>
+            <a:off x="6396057" y="249715"/>
             <a:ext cx="1219200" cy="1219200"/>
           </a:xfrm>
           <a:prstGeom prst="rect">
@@ -12742,7 +12082,7 @@
         </p:blipFill>
         <p:spPr>
           <a:xfrm>
-            <a:off x="1652285" y="4550571"/>
+            <a:off x="322686" y="1525686"/>
             <a:ext cx="1219200" cy="1219200"/>
           </a:xfrm>
           <a:prstGeom prst="rect">
@@ -12773,7 +12113,7 @@
         </p:blipFill>
         <p:spPr>
           <a:xfrm>
-            <a:off x="1613599" y="3153457"/>
+            <a:off x="9120229" y="275315"/>
             <a:ext cx="1219200" cy="1219200"/>
           </a:xfrm>
           <a:prstGeom prst="rect">
@@ -12804,7 +12144,7 @@
         </p:blipFill>
         <p:spPr>
           <a:xfrm>
-            <a:off x="3173942" y="1813229"/>
+            <a:off x="10460572" y="306486"/>
             <a:ext cx="1219200" cy="1219200"/>
           </a:xfrm>
           <a:prstGeom prst="rect">
@@ -12835,7 +12175,7 @@
         </p:blipFill>
         <p:spPr>
           <a:xfrm>
-            <a:off x="3173942" y="359229"/>
+            <a:off x="3179485" y="1494515"/>
             <a:ext cx="1219200" cy="1219200"/>
           </a:xfrm>
           <a:prstGeom prst="rect">
@@ -12866,7 +12206,7 @@
         </p:blipFill>
         <p:spPr>
           <a:xfrm>
-            <a:off x="3198342" y="3153457"/>
+            <a:off x="1841371" y="1525686"/>
             <a:ext cx="1219200" cy="1219200"/>
           </a:xfrm>
           <a:prstGeom prst="rect">
@@ -12897,7 +12237,7 @@
         </p:blipFill>
         <p:spPr>
           <a:xfrm>
-            <a:off x="3157485" y="4607457"/>
+            <a:off x="4728943" y="1468915"/>
             <a:ext cx="1219200" cy="1219200"/>
           </a:xfrm>
           <a:prstGeom prst="rect">
@@ -12928,7 +12268,7 @@
         </p:blipFill>
         <p:spPr>
           <a:xfrm>
-            <a:off x="4695599" y="1756343"/>
+            <a:off x="7809086" y="1525686"/>
             <a:ext cx="1219200" cy="1219200"/>
           </a:xfrm>
           <a:prstGeom prst="rect">
@@ -12959,7 +12299,7 @@
         </p:blipFill>
         <p:spPr>
           <a:xfrm>
-            <a:off x="4727399" y="360686"/>
+            <a:off x="6376800" y="1525686"/>
             <a:ext cx="1219200" cy="1219200"/>
           </a:xfrm>
           <a:prstGeom prst="rect">
@@ -12990,7 +12330,7 @@
         </p:blipFill>
         <p:spPr>
           <a:xfrm>
-            <a:off x="6280856" y="359229"/>
+            <a:off x="9237900" y="1525686"/>
             <a:ext cx="1219200" cy="1219200"/>
           </a:xfrm>
           <a:prstGeom prst="rect">
@@ -13021,7 +12361,7 @@
         </p:blipFill>
         <p:spPr>
           <a:xfrm>
-            <a:off x="4783085" y="3247857"/>
+            <a:off x="10404571" y="1519943"/>
             <a:ext cx="1219200" cy="1219200"/>
           </a:xfrm>
           <a:prstGeom prst="rect">
@@ -13052,7 +12392,7 @@
         </p:blipFill>
         <p:spPr>
           <a:xfrm>
-            <a:off x="4826685" y="4643514"/>
+            <a:off x="1841371" y="3030143"/>
             <a:ext cx="1219200" cy="1219200"/>
           </a:xfrm>
           <a:prstGeom prst="rect">
@@ -13083,7 +12423,7 @@
         </p:blipFill>
         <p:spPr>
           <a:xfrm>
-            <a:off x="6280856" y="3247857"/>
+            <a:off x="322686" y="3030143"/>
             <a:ext cx="1219200" cy="1219200"/>
           </a:xfrm>
           <a:prstGeom prst="rect">
@@ -13114,7 +12454,7 @@
         </p:blipFill>
         <p:spPr>
           <a:xfrm>
-            <a:off x="6217256" y="1813229"/>
+            <a:off x="4728943" y="3030143"/>
             <a:ext cx="1219200" cy="1219200"/>
           </a:xfrm>
           <a:prstGeom prst="rect">
@@ -13145,7 +12485,7 @@
         </p:blipFill>
         <p:spPr>
           <a:xfrm>
-            <a:off x="7804999" y="1938286"/>
+            <a:off x="3338570" y="3030143"/>
             <a:ext cx="1219200" cy="1219200"/>
           </a:xfrm>
           <a:prstGeom prst="rect">
@@ -13176,7 +12516,7 @@
         </p:blipFill>
         <p:spPr>
           <a:xfrm>
-            <a:off x="7804999" y="412829"/>
+            <a:off x="1835343" y="4534600"/>
             <a:ext cx="1219200" cy="1219200"/>
           </a:xfrm>
           <a:prstGeom prst="rect">
@@ -13207,7 +12547,7 @@
         </p:blipFill>
         <p:spPr>
           <a:xfrm>
-            <a:off x="6280856" y="4607457"/>
+            <a:off x="322686" y="4534600"/>
             <a:ext cx="1219200" cy="1219200"/>
           </a:xfrm>
           <a:prstGeom prst="rect">
@@ -13238,7 +12578,7 @@
         </p:blipFill>
         <p:spPr>
           <a:xfrm>
-            <a:off x="9324170" y="412829"/>
+            <a:off x="6376800" y="3162943"/>
             <a:ext cx="1219200" cy="1219200"/>
           </a:xfrm>
           <a:prstGeom prst="rect">
@@ -13269,7 +12609,7 @@
         </p:blipFill>
         <p:spPr>
           <a:xfrm>
-            <a:off x="7778627" y="3247857"/>
+            <a:off x="10404571" y="3109800"/>
             <a:ext cx="1219200" cy="1219200"/>
           </a:xfrm>
           <a:prstGeom prst="rect">
@@ -13300,7 +12640,7 @@
         </p:blipFill>
         <p:spPr>
           <a:xfrm>
-            <a:off x="7804999" y="4683628"/>
+            <a:off x="3338570" y="4534600"/>
             <a:ext cx="1219200" cy="1219200"/>
           </a:xfrm>
           <a:prstGeom prst="rect">
@@ -13331,7 +12671,7 @@
         </p:blipFill>
         <p:spPr>
           <a:xfrm>
-            <a:off x="9392742" y="3247857"/>
+            <a:off x="4831171" y="4560286"/>
             <a:ext cx="1219200" cy="1219200"/>
           </a:xfrm>
           <a:prstGeom prst="rect">
@@ -13362,7 +12702,69 @@
         </p:blipFill>
         <p:spPr>
           <a:xfrm>
-            <a:off x="9392742" y="1813229"/>
+            <a:off x="9028286" y="4560286"/>
+            <a:ext cx="1219200" cy="1219200"/>
+          </a:xfrm>
+          <a:prstGeom prst="rect">
+            <a:avLst/>
+          </a:prstGeom>
+        </p:spPr>
+      </p:pic>
+      <p:pic>
+        <p:nvPicPr>
+          <p:cNvPr id="29" name="Picture 28"/>
+          <p:cNvPicPr>
+            <a:picLocks noChangeAspect="1"/>
+          </p:cNvPicPr>
+          <p:nvPr/>
+        </p:nvPicPr>
+        <p:blipFill>
+          <a:blip r:embed="rId29">
+            <a:lum bright="70000" contrast="-70000"/>
+            <a:extLst>
+              <a:ext uri="{28A0092B-C50C-407E-A947-70E740481C1C}">
+                <a14:useLocalDpi xmlns:a14="http://schemas.microsoft.com/office/drawing/2010/main" val="0"/>
+              </a:ext>
+            </a:extLst>
+          </a:blip>
+          <a:stretch>
+            <a:fillRect/>
+          </a:stretch>
+        </p:blipFill>
+        <p:spPr>
+          <a:xfrm>
+            <a:off x="8955600" y="3315400"/>
+            <a:ext cx="1219200" cy="1219200"/>
+          </a:xfrm>
+          <a:prstGeom prst="rect">
+            <a:avLst/>
+          </a:prstGeom>
+        </p:spPr>
+      </p:pic>
+      <p:pic>
+        <p:nvPicPr>
+          <p:cNvPr id="30" name="Picture 29"/>
+          <p:cNvPicPr>
+            <a:picLocks noChangeAspect="1"/>
+          </p:cNvPicPr>
+          <p:nvPr/>
+        </p:nvPicPr>
+        <p:blipFill>
+          <a:blip r:embed="rId30">
+            <a:lum bright="70000" contrast="-70000"/>
+            <a:extLst>
+              <a:ext uri="{28A0092B-C50C-407E-A947-70E740481C1C}">
+                <a14:useLocalDpi xmlns:a14="http://schemas.microsoft.com/office/drawing/2010/main" val="0"/>
+              </a:ext>
+            </a:extLst>
+          </a:blip>
+          <a:stretch>
+            <a:fillRect/>
+          </a:stretch>
+        </p:blipFill>
+        <p:spPr>
+          <a:xfrm>
+            <a:off x="10457100" y="4534600"/>
             <a:ext cx="1219200" cy="1219200"/>
           </a:xfrm>
           <a:prstGeom prst="rect">
@@ -13373,7 +12775,7 @@
     </p:spTree>
     <p:extLst>
       <p:ext uri="{BB962C8B-B14F-4D97-AF65-F5344CB8AC3E}">
-        <p14:creationId xmlns:p14="http://schemas.microsoft.com/office/powerpoint/2010/main" val="3126433562"/>
+        <p14:creationId xmlns:p14="http://schemas.microsoft.com/office/powerpoint/2010/main" val="823657930"/>
       </p:ext>
     </p:extLst>
   </p:cSld>
@@ -13423,7 +12825,7 @@
         </p:blipFill>
         <p:spPr>
           <a:xfrm>
-            <a:off x="643486" y="520286"/>
+            <a:off x="130628" y="359229"/>
             <a:ext cx="1219200" cy="1219200"/>
           </a:xfrm>
           <a:prstGeom prst="rect">
@@ -13454,7 +12856,7 @@
         </p:blipFill>
         <p:spPr>
           <a:xfrm>
-            <a:off x="654401" y="3364486"/>
+            <a:off x="94399" y="4550571"/>
             <a:ext cx="1219200" cy="1219200"/>
           </a:xfrm>
           <a:prstGeom prst="rect">
@@ -13485,7 +12887,7 @@
         </p:blipFill>
         <p:spPr>
           <a:xfrm>
-            <a:off x="571600" y="4830522"/>
+            <a:off x="94399" y="3153457"/>
             <a:ext cx="1219200" cy="1219200"/>
           </a:xfrm>
           <a:prstGeom prst="rect">
@@ -13516,7 +12918,7 @@
         </p:blipFill>
         <p:spPr>
           <a:xfrm>
-            <a:off x="2286800" y="4852844"/>
+            <a:off x="94399" y="1756343"/>
             <a:ext cx="1219200" cy="1219200"/>
           </a:xfrm>
           <a:prstGeom prst="rect">
@@ -13547,7 +12949,7 @@
         </p:blipFill>
         <p:spPr>
           <a:xfrm>
-            <a:off x="2155658" y="3397482"/>
+            <a:off x="1652285" y="359229"/>
             <a:ext cx="1219200" cy="1219200"/>
           </a:xfrm>
           <a:prstGeom prst="rect">
@@ -13578,7 +12980,7 @@
         </p:blipFill>
         <p:spPr>
           <a:xfrm>
-            <a:off x="2303086" y="1959441"/>
+            <a:off x="1652285" y="1756343"/>
             <a:ext cx="1219200" cy="1219200"/>
           </a:xfrm>
           <a:prstGeom prst="rect">
@@ -13609,7 +13011,7 @@
         </p:blipFill>
         <p:spPr>
           <a:xfrm>
-            <a:off x="2303086" y="521400"/>
+            <a:off x="1652285" y="4550571"/>
             <a:ext cx="1219200" cy="1219200"/>
           </a:xfrm>
           <a:prstGeom prst="rect">
@@ -13640,7 +13042,7 @@
         </p:blipFill>
         <p:spPr>
           <a:xfrm>
-            <a:off x="3878400" y="4868530"/>
+            <a:off x="1613599" y="3153457"/>
             <a:ext cx="1219200" cy="1219200"/>
           </a:xfrm>
           <a:prstGeom prst="rect">
@@ -13671,7 +13073,7 @@
         </p:blipFill>
         <p:spPr>
           <a:xfrm>
-            <a:off x="3907314" y="3421143"/>
+            <a:off x="3173942" y="1813229"/>
             <a:ext cx="1219200" cy="1219200"/>
           </a:xfrm>
           <a:prstGeom prst="rect">
@@ -13702,7 +13104,7 @@
         </p:blipFill>
         <p:spPr>
           <a:xfrm>
-            <a:off x="3907314" y="1750200"/>
+            <a:off x="3173942" y="359229"/>
             <a:ext cx="1219200" cy="1219200"/>
           </a:xfrm>
           <a:prstGeom prst="rect">
@@ -13733,7 +13135,7 @@
         </p:blipFill>
         <p:spPr>
           <a:xfrm>
-            <a:off x="4074799" y="371400"/>
+            <a:off x="3198342" y="3153457"/>
             <a:ext cx="1219200" cy="1219200"/>
           </a:xfrm>
           <a:prstGeom prst="rect">
@@ -13764,7 +13166,7 @@
         </p:blipFill>
         <p:spPr>
           <a:xfrm>
-            <a:off x="5554400" y="4868530"/>
+            <a:off x="3157485" y="4607457"/>
             <a:ext cx="1219200" cy="1219200"/>
           </a:xfrm>
           <a:prstGeom prst="rect">
@@ -13795,7 +13197,7 @@
         </p:blipFill>
         <p:spPr>
           <a:xfrm>
-            <a:off x="5554400" y="3364486"/>
+            <a:off x="4695599" y="1756343"/>
             <a:ext cx="1219200" cy="1219200"/>
           </a:xfrm>
           <a:prstGeom prst="rect">
@@ -13826,7 +13228,7 @@
         </p:blipFill>
         <p:spPr>
           <a:xfrm>
-            <a:off x="5554400" y="1750200"/>
+            <a:off x="4727399" y="360686"/>
             <a:ext cx="1219200" cy="1219200"/>
           </a:xfrm>
           <a:prstGeom prst="rect">
@@ -13857,7 +13259,7 @@
         </p:blipFill>
         <p:spPr>
           <a:xfrm>
-            <a:off x="5734399" y="361800"/>
+            <a:off x="6280856" y="359229"/>
             <a:ext cx="1219200" cy="1219200"/>
           </a:xfrm>
           <a:prstGeom prst="rect">
@@ -13888,7 +13290,7 @@
         </p:blipFill>
         <p:spPr>
           <a:xfrm>
-            <a:off x="7228400" y="4868530"/>
+            <a:off x="4783085" y="3247857"/>
             <a:ext cx="1219200" cy="1219200"/>
           </a:xfrm>
           <a:prstGeom prst="rect">
@@ -13919,7 +13321,7 @@
         </p:blipFill>
         <p:spPr>
           <a:xfrm>
-            <a:off x="8984800" y="4872758"/>
+            <a:off x="4826685" y="4643514"/>
             <a:ext cx="1219200" cy="1219200"/>
           </a:xfrm>
           <a:prstGeom prst="rect">
@@ -13950,7 +13352,7 @@
         </p:blipFill>
         <p:spPr>
           <a:xfrm>
-            <a:off x="10576400" y="4872758"/>
+            <a:off x="6280856" y="3247857"/>
             <a:ext cx="1219200" cy="1219200"/>
           </a:xfrm>
           <a:prstGeom prst="rect">
@@ -13981,7 +13383,7 @@
         </p:blipFill>
         <p:spPr>
           <a:xfrm>
-            <a:off x="7337714" y="3421143"/>
+            <a:off x="6217256" y="1813229"/>
             <a:ext cx="1219200" cy="1219200"/>
           </a:xfrm>
           <a:prstGeom prst="rect">
@@ -14012,7 +13414,7 @@
         </p:blipFill>
         <p:spPr>
           <a:xfrm>
-            <a:off x="7337714" y="1791156"/>
+            <a:off x="7804999" y="1938286"/>
             <a:ext cx="1219200" cy="1219200"/>
           </a:xfrm>
           <a:prstGeom prst="rect">
@@ -14043,7 +13445,7 @@
         </p:blipFill>
         <p:spPr>
           <a:xfrm>
-            <a:off x="7337714" y="435085"/>
+            <a:off x="7804999" y="412829"/>
             <a:ext cx="1219200" cy="1219200"/>
           </a:xfrm>
           <a:prstGeom prst="rect">
@@ -14074,7 +13476,7 @@
         </p:blipFill>
         <p:spPr>
           <a:xfrm>
-            <a:off x="8953200" y="3384857"/>
+            <a:off x="6280856" y="4607457"/>
             <a:ext cx="1219200" cy="1219200"/>
           </a:xfrm>
           <a:prstGeom prst="rect">
@@ -14105,7 +13507,7 @@
         </p:blipFill>
         <p:spPr>
           <a:xfrm>
-            <a:off x="8984800" y="1816042"/>
+            <a:off x="9324170" y="412829"/>
             <a:ext cx="1219200" cy="1219200"/>
           </a:xfrm>
           <a:prstGeom prst="rect">
@@ -14136,7 +13538,7 @@
         </p:blipFill>
         <p:spPr>
           <a:xfrm>
-            <a:off x="10683085" y="3400200"/>
+            <a:off x="7778627" y="3247857"/>
             <a:ext cx="1219200" cy="1219200"/>
           </a:xfrm>
           <a:prstGeom prst="rect">
@@ -14167,7 +13569,7 @@
         </p:blipFill>
         <p:spPr>
           <a:xfrm>
-            <a:off x="8984800" y="326114"/>
+            <a:off x="7804999" y="4683628"/>
             <a:ext cx="1219200" cy="1219200"/>
           </a:xfrm>
           <a:prstGeom prst="rect">
@@ -14198,7 +13600,7 @@
         </p:blipFill>
         <p:spPr>
           <a:xfrm>
-            <a:off x="10504000" y="1927642"/>
+            <a:off x="9392742" y="3247857"/>
             <a:ext cx="1219200" cy="1219200"/>
           </a:xfrm>
           <a:prstGeom prst="rect">
@@ -14229,7 +13631,7 @@
         </p:blipFill>
         <p:spPr>
           <a:xfrm>
-            <a:off x="10504000" y="314828"/>
+            <a:off x="9392742" y="1813229"/>
             <a:ext cx="1219200" cy="1219200"/>
           </a:xfrm>
           <a:prstGeom prst="rect">
@@ -14240,7 +13642,7 @@
     </p:spTree>
     <p:extLst>
       <p:ext uri="{BB962C8B-B14F-4D97-AF65-F5344CB8AC3E}">
-        <p14:creationId xmlns:p14="http://schemas.microsoft.com/office/powerpoint/2010/main" val="399454265"/>
+        <p14:creationId xmlns:p14="http://schemas.microsoft.com/office/powerpoint/2010/main" val="3126433562"/>
       </p:ext>
     </p:extLst>
   </p:cSld>
@@ -14290,7 +13692,7 @@
         </p:blipFill>
         <p:spPr>
           <a:xfrm>
-            <a:off x="166914" y="286715"/>
+            <a:off x="643486" y="520286"/>
             <a:ext cx="1219200" cy="1219200"/>
           </a:xfrm>
           <a:prstGeom prst="rect">
@@ -14321,7 +13723,7 @@
         </p:blipFill>
         <p:spPr>
           <a:xfrm>
-            <a:off x="166914" y="4395429"/>
+            <a:off x="654401" y="3364486"/>
             <a:ext cx="1219200" cy="1219200"/>
           </a:xfrm>
           <a:prstGeom prst="rect">
@@ -14352,7 +13754,7 @@
         </p:blipFill>
         <p:spPr>
           <a:xfrm>
-            <a:off x="166914" y="3069944"/>
+            <a:off x="571600" y="4830522"/>
             <a:ext cx="1219200" cy="1219200"/>
           </a:xfrm>
           <a:prstGeom prst="rect">
@@ -14383,7 +13785,7 @@
         </p:blipFill>
         <p:spPr>
           <a:xfrm>
-            <a:off x="254057" y="1744459"/>
+            <a:off x="2286800" y="4852844"/>
             <a:ext cx="1219200" cy="1219200"/>
           </a:xfrm>
           <a:prstGeom prst="rect">
@@ -14414,7 +13816,7 @@
         </p:blipFill>
         <p:spPr>
           <a:xfrm>
-            <a:off x="2114343" y="1662173"/>
+            <a:off x="2155658" y="3397482"/>
             <a:ext cx="1219200" cy="1219200"/>
           </a:xfrm>
           <a:prstGeom prst="rect">
@@ -14445,7 +13847,7 @@
         </p:blipFill>
         <p:spPr>
           <a:xfrm>
-            <a:off x="2114343" y="286715"/>
+            <a:off x="2303086" y="1959441"/>
             <a:ext cx="1219200" cy="1219200"/>
           </a:xfrm>
           <a:prstGeom prst="rect">
@@ -14476,7 +13878,7 @@
         </p:blipFill>
         <p:spPr>
           <a:xfrm>
-            <a:off x="2114343" y="3037631"/>
+            <a:off x="2303086" y="521400"/>
             <a:ext cx="1219200" cy="1219200"/>
           </a:xfrm>
           <a:prstGeom prst="rect">
@@ -14507,7 +13909,7 @@
         </p:blipFill>
         <p:spPr>
           <a:xfrm>
-            <a:off x="3873029" y="286715"/>
+            <a:off x="3878400" y="4868530"/>
             <a:ext cx="1219200" cy="1219200"/>
           </a:xfrm>
           <a:prstGeom prst="rect">
@@ -14538,7 +13940,7 @@
         </p:blipFill>
         <p:spPr>
           <a:xfrm>
-            <a:off x="2040743" y="4414490"/>
+            <a:off x="3907314" y="3421143"/>
             <a:ext cx="1219200" cy="1219200"/>
           </a:xfrm>
           <a:prstGeom prst="rect">
@@ -14569,7 +13971,7 @@
         </p:blipFill>
         <p:spPr>
           <a:xfrm>
-            <a:off x="3733828" y="4505915"/>
+            <a:off x="3907314" y="1750200"/>
             <a:ext cx="1219200" cy="1219200"/>
           </a:xfrm>
           <a:prstGeom prst="rect">
@@ -14600,7 +14002,7 @@
         </p:blipFill>
         <p:spPr>
           <a:xfrm>
-            <a:off x="3873029" y="1636715"/>
+            <a:off x="4074799" y="371400"/>
             <a:ext cx="1219200" cy="1219200"/>
           </a:xfrm>
           <a:prstGeom prst="rect">
@@ -14631,7 +14033,7 @@
         </p:blipFill>
         <p:spPr>
           <a:xfrm>
-            <a:off x="3899200" y="3136715"/>
+            <a:off x="5554400" y="4868530"/>
             <a:ext cx="1219200" cy="1219200"/>
           </a:xfrm>
           <a:prstGeom prst="rect">
@@ -14662,7 +14064,7 @@
         </p:blipFill>
         <p:spPr>
           <a:xfrm>
-            <a:off x="7286457" y="286715"/>
+            <a:off x="5554400" y="3364486"/>
             <a:ext cx="1219200" cy="1219200"/>
           </a:xfrm>
           <a:prstGeom prst="rect">
@@ -14693,7 +14095,7 @@
         </p:blipFill>
         <p:spPr>
           <a:xfrm>
-            <a:off x="5634543" y="1636715"/>
+            <a:off x="5554400" y="1750200"/>
             <a:ext cx="1219200" cy="1219200"/>
           </a:xfrm>
           <a:prstGeom prst="rect">
@@ -14724,7 +14126,7 @@
         </p:blipFill>
         <p:spPr>
           <a:xfrm>
-            <a:off x="10680457" y="3202203"/>
+            <a:off x="5734399" y="361800"/>
             <a:ext cx="1219200" cy="1219200"/>
           </a:xfrm>
           <a:prstGeom prst="rect">
@@ -14755,7 +14157,7 @@
         </p:blipFill>
         <p:spPr>
           <a:xfrm>
-            <a:off x="9215543" y="1744459"/>
+            <a:off x="7228400" y="4868530"/>
             <a:ext cx="1219200" cy="1219200"/>
           </a:xfrm>
           <a:prstGeom prst="rect">
@@ -14786,7 +14188,7 @@
         </p:blipFill>
         <p:spPr>
           <a:xfrm>
-            <a:off x="7396057" y="1805915"/>
+            <a:off x="8984800" y="4872758"/>
             <a:ext cx="1219200" cy="1219200"/>
           </a:xfrm>
           <a:prstGeom prst="rect">
@@ -14817,7 +14219,7 @@
         </p:blipFill>
         <p:spPr>
           <a:xfrm>
-            <a:off x="9167543" y="286715"/>
+            <a:off x="10576400" y="4872758"/>
             <a:ext cx="1219200" cy="1219200"/>
           </a:xfrm>
           <a:prstGeom prst="rect">
@@ -14848,7 +14250,7 @@
         </p:blipFill>
         <p:spPr>
           <a:xfrm>
-            <a:off x="10680457" y="1744459"/>
+            <a:off x="7337714" y="3421143"/>
             <a:ext cx="1219200" cy="1219200"/>
           </a:xfrm>
           <a:prstGeom prst="rect">
@@ -14879,7 +14281,7 @@
         </p:blipFill>
         <p:spPr>
           <a:xfrm>
-            <a:off x="10680457" y="286715"/>
+            <a:off x="7337714" y="1791156"/>
             <a:ext cx="1219200" cy="1219200"/>
           </a:xfrm>
           <a:prstGeom prst="rect">
@@ -14910,7 +14312,7 @@
         </p:blipFill>
         <p:spPr>
           <a:xfrm>
-            <a:off x="7396057" y="3202203"/>
+            <a:off x="7337714" y="435085"/>
             <a:ext cx="1219200" cy="1219200"/>
           </a:xfrm>
           <a:prstGeom prst="rect">
@@ -14941,7 +14343,7 @@
         </p:blipFill>
         <p:spPr>
           <a:xfrm>
-            <a:off x="9285314" y="3202203"/>
+            <a:off x="8953200" y="3384857"/>
             <a:ext cx="1219200" cy="1219200"/>
           </a:xfrm>
           <a:prstGeom prst="rect">
@@ -14972,7 +14374,7 @@
         </p:blipFill>
         <p:spPr>
           <a:xfrm>
-            <a:off x="7396057" y="4665515"/>
+            <a:off x="8984800" y="1816042"/>
             <a:ext cx="1219200" cy="1219200"/>
           </a:xfrm>
           <a:prstGeom prst="rect">
@@ -15003,7 +14405,7 @@
         </p:blipFill>
         <p:spPr>
           <a:xfrm>
-            <a:off x="9279343" y="4665515"/>
+            <a:off x="10683085" y="3400200"/>
             <a:ext cx="1219200" cy="1219200"/>
           </a:xfrm>
           <a:prstGeom prst="rect">
@@ -15034,7 +14436,7 @@
         </p:blipFill>
         <p:spPr>
           <a:xfrm>
-            <a:off x="10694114" y="4665515"/>
+            <a:off x="8984800" y="326114"/>
             <a:ext cx="1219200" cy="1219200"/>
           </a:xfrm>
           <a:prstGeom prst="rect">
@@ -15065,7 +14467,7 @@
         </p:blipFill>
         <p:spPr>
           <a:xfrm>
-            <a:off x="5634543" y="3176229"/>
+            <a:off x="10504000" y="1927642"/>
             <a:ext cx="1219200" cy="1219200"/>
           </a:xfrm>
           <a:prstGeom prst="rect">
@@ -15096,7 +14498,7 @@
         </p:blipFill>
         <p:spPr>
           <a:xfrm>
-            <a:off x="5634543" y="286715"/>
+            <a:off x="10504000" y="314828"/>
             <a:ext cx="1219200" cy="1219200"/>
           </a:xfrm>
           <a:prstGeom prst="rect">
@@ -15107,7 +14509,7 @@
     </p:spTree>
     <p:extLst>
       <p:ext uri="{BB962C8B-B14F-4D97-AF65-F5344CB8AC3E}">
-        <p14:creationId xmlns:p14="http://schemas.microsoft.com/office/powerpoint/2010/main" val="3324423259"/>
+        <p14:creationId xmlns:p14="http://schemas.microsoft.com/office/powerpoint/2010/main" val="399454265"/>
       </p:ext>
     </p:extLst>
   </p:cSld>
@@ -15157,7 +14559,7 @@
         </p:blipFill>
         <p:spPr>
           <a:xfrm>
-            <a:off x="2066300" y="4482743"/>
+            <a:off x="166914" y="286715"/>
             <a:ext cx="1219200" cy="1219200"/>
           </a:xfrm>
           <a:prstGeom prst="rect">
@@ -15188,7 +14590,7 @@
         </p:blipFill>
         <p:spPr>
           <a:xfrm>
-            <a:off x="3544387" y="3100200"/>
+            <a:off x="166914" y="4395429"/>
             <a:ext cx="1219200" cy="1219200"/>
           </a:xfrm>
           <a:prstGeom prst="rect">
@@ -15219,7 +14621,7 @@
         </p:blipFill>
         <p:spPr>
           <a:xfrm>
-            <a:off x="1959644" y="3077257"/>
+            <a:off x="166914" y="3069944"/>
             <a:ext cx="1219200" cy="1219200"/>
           </a:xfrm>
           <a:prstGeom prst="rect">
@@ -15250,7 +14652,7 @@
         </p:blipFill>
         <p:spPr>
           <a:xfrm>
-            <a:off x="220687" y="3077257"/>
+            <a:off x="254057" y="1744459"/>
             <a:ext cx="1219200" cy="1219200"/>
           </a:xfrm>
           <a:prstGeom prst="rect">
@@ -15281,7 +14683,7 @@
         </p:blipFill>
         <p:spPr>
           <a:xfrm>
-            <a:off x="252087" y="4629000"/>
+            <a:off x="2114343" y="1662173"/>
             <a:ext cx="1219200" cy="1219200"/>
           </a:xfrm>
           <a:prstGeom prst="rect">
@@ -15312,7 +14714,7 @@
         </p:blipFill>
         <p:spPr>
           <a:xfrm>
-            <a:off x="1959644" y="1565771"/>
+            <a:off x="2114343" y="286715"/>
             <a:ext cx="1219200" cy="1219200"/>
           </a:xfrm>
           <a:prstGeom prst="rect">
@@ -15343,7 +14745,7 @@
         </p:blipFill>
         <p:spPr>
           <a:xfrm>
-            <a:off x="3652987" y="4539457"/>
+            <a:off x="2114343" y="3037631"/>
             <a:ext cx="1219200" cy="1219200"/>
           </a:xfrm>
           <a:prstGeom prst="rect">
@@ -15374,7 +14776,7 @@
         </p:blipFill>
         <p:spPr>
           <a:xfrm>
-            <a:off x="2066300" y="346571"/>
+            <a:off x="3873029" y="286715"/>
             <a:ext cx="1219200" cy="1219200"/>
           </a:xfrm>
           <a:prstGeom prst="rect">
@@ -15405,7 +14807,7 @@
         </p:blipFill>
         <p:spPr>
           <a:xfrm>
-            <a:off x="5317644" y="358887"/>
+            <a:off x="2040743" y="4414490"/>
             <a:ext cx="1219200" cy="1219200"/>
           </a:xfrm>
           <a:prstGeom prst="rect">
@@ -15436,7 +14838,7 @@
         </p:blipFill>
         <p:spPr>
           <a:xfrm>
-            <a:off x="3638644" y="1685343"/>
+            <a:off x="3733828" y="4505915"/>
             <a:ext cx="1219200" cy="1219200"/>
           </a:xfrm>
           <a:prstGeom prst="rect">
@@ -15467,7 +14869,7 @@
         </p:blipFill>
         <p:spPr>
           <a:xfrm>
-            <a:off x="3638644" y="368315"/>
+            <a:off x="3873029" y="1636715"/>
             <a:ext cx="1219200" cy="1219200"/>
           </a:xfrm>
           <a:prstGeom prst="rect">
@@ -15498,7 +14900,7 @@
         </p:blipFill>
         <p:spPr>
           <a:xfrm>
-            <a:off x="5317644" y="4609800"/>
+            <a:off x="3899200" y="3136715"/>
             <a:ext cx="1219200" cy="1219200"/>
           </a:xfrm>
           <a:prstGeom prst="rect">
@@ -15529,7 +14931,7 @@
         </p:blipFill>
         <p:spPr>
           <a:xfrm>
-            <a:off x="5317644" y="1823228"/>
+            <a:off x="7286457" y="286715"/>
             <a:ext cx="1219200" cy="1219200"/>
           </a:xfrm>
           <a:prstGeom prst="rect">
@@ -15560,7 +14962,7 @@
         </p:blipFill>
         <p:spPr>
           <a:xfrm>
-            <a:off x="5317644" y="3208114"/>
+            <a:off x="5634543" y="1636715"/>
             <a:ext cx="1219200" cy="1219200"/>
           </a:xfrm>
           <a:prstGeom prst="rect">
@@ -15591,7 +14993,7 @@
         </p:blipFill>
         <p:spPr>
           <a:xfrm>
-            <a:off x="7078800" y="368315"/>
+            <a:off x="10680457" y="3202203"/>
             <a:ext cx="1219200" cy="1219200"/>
           </a:xfrm>
           <a:prstGeom prst="rect">
@@ -15622,7 +15024,7 @@
         </p:blipFill>
         <p:spPr>
           <a:xfrm>
-            <a:off x="7129600" y="1793142"/>
+            <a:off x="9215543" y="1744459"/>
             <a:ext cx="1219200" cy="1219200"/>
           </a:xfrm>
           <a:prstGeom prst="rect">
@@ -15653,7 +15055,7 @@
         </p:blipFill>
         <p:spPr>
           <a:xfrm>
-            <a:off x="7129600" y="3320257"/>
+            <a:off x="7396057" y="1805915"/>
             <a:ext cx="1219200" cy="1219200"/>
           </a:xfrm>
           <a:prstGeom prst="rect">
@@ -15684,7 +15086,7 @@
         </p:blipFill>
         <p:spPr>
           <a:xfrm>
-            <a:off x="7192200" y="4609800"/>
+            <a:off x="9167543" y="286715"/>
             <a:ext cx="1219200" cy="1219200"/>
           </a:xfrm>
           <a:prstGeom prst="rect">
@@ -15715,7 +15117,7 @@
         </p:blipFill>
         <p:spPr>
           <a:xfrm>
-            <a:off x="8757800" y="466143"/>
+            <a:off x="10680457" y="1744459"/>
             <a:ext cx="1219200" cy="1219200"/>
           </a:xfrm>
           <a:prstGeom prst="rect">
@@ -15746,7 +15148,7 @@
         </p:blipFill>
         <p:spPr>
           <a:xfrm>
-            <a:off x="8736429" y="3349857"/>
+            <a:off x="10680457" y="286715"/>
             <a:ext cx="1219200" cy="1219200"/>
           </a:xfrm>
           <a:prstGeom prst="rect">
@@ -15777,7 +15179,7 @@
         </p:blipFill>
         <p:spPr>
           <a:xfrm>
-            <a:off x="8786400" y="1865429"/>
+            <a:off x="7396057" y="3202203"/>
             <a:ext cx="1219200" cy="1219200"/>
           </a:xfrm>
           <a:prstGeom prst="rect">
@@ -15808,7 +15210,7 @@
         </p:blipFill>
         <p:spPr>
           <a:xfrm>
-            <a:off x="8729630" y="4750200"/>
+            <a:off x="9285314" y="3202203"/>
             <a:ext cx="1219200" cy="1219200"/>
           </a:xfrm>
           <a:prstGeom prst="rect">
@@ -15839,7 +15241,7 @@
         </p:blipFill>
         <p:spPr>
           <a:xfrm>
-            <a:off x="10436800" y="3320257"/>
+            <a:off x="7396057" y="4665515"/>
             <a:ext cx="1219200" cy="1219200"/>
           </a:xfrm>
           <a:prstGeom prst="rect">
@@ -15870,7 +15272,7 @@
         </p:blipFill>
         <p:spPr>
           <a:xfrm>
-            <a:off x="10525357" y="1988914"/>
+            <a:off x="9279343" y="4665515"/>
             <a:ext cx="1219200" cy="1219200"/>
           </a:xfrm>
           <a:prstGeom prst="rect">
@@ -15901,7 +15303,7 @@
         </p:blipFill>
         <p:spPr>
           <a:xfrm>
-            <a:off x="10436800" y="466143"/>
+            <a:off x="10694114" y="4665515"/>
             <a:ext cx="1219200" cy="1219200"/>
           </a:xfrm>
           <a:prstGeom prst="rect">
@@ -15932,7 +15334,7 @@
         </p:blipFill>
         <p:spPr>
           <a:xfrm>
-            <a:off x="249658" y="1685343"/>
+            <a:off x="5634543" y="3176229"/>
             <a:ext cx="1219200" cy="1219200"/>
           </a:xfrm>
           <a:prstGeom prst="rect">
@@ -15963,7 +15365,7 @@
         </p:blipFill>
         <p:spPr>
           <a:xfrm>
-            <a:off x="249658" y="325857"/>
+            <a:off x="5634543" y="286715"/>
             <a:ext cx="1219200" cy="1219200"/>
           </a:xfrm>
           <a:prstGeom prst="rect">
@@ -15974,7 +15376,7 @@
     </p:spTree>
     <p:extLst>
       <p:ext uri="{BB962C8B-B14F-4D97-AF65-F5344CB8AC3E}">
-        <p14:creationId xmlns:p14="http://schemas.microsoft.com/office/powerpoint/2010/main" val="438152526"/>
+        <p14:creationId xmlns:p14="http://schemas.microsoft.com/office/powerpoint/2010/main" val="3324423259"/>
       </p:ext>
     </p:extLst>
   </p:cSld>
@@ -16024,7 +15426,7 @@
         </p:blipFill>
         <p:spPr>
           <a:xfrm>
-            <a:off x="297543" y="293914"/>
+            <a:off x="2066300" y="4482743"/>
             <a:ext cx="1219200" cy="1219200"/>
           </a:xfrm>
           <a:prstGeom prst="rect">
@@ -16055,7 +15457,7 @@
         </p:blipFill>
         <p:spPr>
           <a:xfrm>
-            <a:off x="297543" y="1670372"/>
+            <a:off x="3544387" y="3100200"/>
             <a:ext cx="1219200" cy="1219200"/>
           </a:xfrm>
           <a:prstGeom prst="rect">
@@ -16086,7 +15488,7 @@
         </p:blipFill>
         <p:spPr>
           <a:xfrm>
-            <a:off x="375086" y="4580546"/>
+            <a:off x="1959644" y="3077257"/>
             <a:ext cx="1219200" cy="1219200"/>
           </a:xfrm>
           <a:prstGeom prst="rect">
@@ -16117,7 +15519,7 @@
         </p:blipFill>
         <p:spPr>
           <a:xfrm>
-            <a:off x="355657" y="3046830"/>
+            <a:off x="220687" y="3077257"/>
             <a:ext cx="1219200" cy="1219200"/>
           </a:xfrm>
           <a:prstGeom prst="rect">
@@ -16148,7 +15550,7 @@
         </p:blipFill>
         <p:spPr>
           <a:xfrm>
-            <a:off x="2065943" y="219000"/>
+            <a:off x="252087" y="4629000"/>
             <a:ext cx="1219200" cy="1219200"/>
           </a:xfrm>
           <a:prstGeom prst="rect">
@@ -16179,7 +15581,7 @@
         </p:blipFill>
         <p:spPr>
           <a:xfrm>
-            <a:off x="2065943" y="3100200"/>
+            <a:off x="1959644" y="1565771"/>
             <a:ext cx="1219200" cy="1219200"/>
           </a:xfrm>
           <a:prstGeom prst="rect">
@@ -16210,7 +15612,7 @@
         </p:blipFill>
         <p:spPr>
           <a:xfrm>
-            <a:off x="1974058" y="1670372"/>
+            <a:off x="3652987" y="4539457"/>
             <a:ext cx="1219200" cy="1219200"/>
           </a:xfrm>
           <a:prstGeom prst="rect">
@@ -16241,7 +15643,7 @@
         </p:blipFill>
         <p:spPr>
           <a:xfrm>
-            <a:off x="2030971" y="4594343"/>
+            <a:off x="2066300" y="346571"/>
             <a:ext cx="1219200" cy="1219200"/>
           </a:xfrm>
           <a:prstGeom prst="rect">
@@ -16272,7 +15674,7 @@
         </p:blipFill>
         <p:spPr>
           <a:xfrm>
-            <a:off x="3834343" y="219000"/>
+            <a:off x="5317644" y="358887"/>
             <a:ext cx="1219200" cy="1219200"/>
           </a:xfrm>
           <a:prstGeom prst="rect">
@@ -16303,7 +15705,7 @@
         </p:blipFill>
         <p:spPr>
           <a:xfrm>
-            <a:off x="3939743" y="4580546"/>
+            <a:off x="3638644" y="1685343"/>
             <a:ext cx="1219200" cy="1219200"/>
           </a:xfrm>
           <a:prstGeom prst="rect">
@@ -16334,7 +15736,7 @@
         </p:blipFill>
         <p:spPr>
           <a:xfrm>
-            <a:off x="3894857" y="1708115"/>
+            <a:off x="3638644" y="368315"/>
             <a:ext cx="1219200" cy="1219200"/>
           </a:xfrm>
           <a:prstGeom prst="rect">
@@ -16365,7 +15767,7 @@
         </p:blipFill>
         <p:spPr>
           <a:xfrm>
-            <a:off x="3941886" y="3046830"/>
+            <a:off x="5317644" y="4609800"/>
             <a:ext cx="1219200" cy="1219200"/>
           </a:xfrm>
           <a:prstGeom prst="rect">
@@ -16396,7 +15798,7 @@
         </p:blipFill>
         <p:spPr>
           <a:xfrm>
-            <a:off x="5571372" y="1767343"/>
+            <a:off x="5317644" y="1823228"/>
             <a:ext cx="1219200" cy="1219200"/>
           </a:xfrm>
           <a:prstGeom prst="rect">
@@ -16427,7 +15829,7 @@
         </p:blipFill>
         <p:spPr>
           <a:xfrm>
-            <a:off x="5602743" y="293914"/>
+            <a:off x="5317644" y="3208114"/>
             <a:ext cx="1219200" cy="1219200"/>
           </a:xfrm>
           <a:prstGeom prst="rect">
@@ -16458,7 +15860,7 @@
         </p:blipFill>
         <p:spPr>
           <a:xfrm>
-            <a:off x="5571372" y="3240772"/>
+            <a:off x="7078800" y="368315"/>
             <a:ext cx="1219200" cy="1219200"/>
           </a:xfrm>
           <a:prstGeom prst="rect">
@@ -16489,7 +15891,7 @@
         </p:blipFill>
         <p:spPr>
           <a:xfrm>
-            <a:off x="7117200" y="388543"/>
+            <a:off x="7129600" y="1793142"/>
             <a:ext cx="1219200" cy="1219200"/>
           </a:xfrm>
           <a:prstGeom prst="rect">
@@ -16520,7 +15922,7 @@
         </p:blipFill>
         <p:spPr>
           <a:xfrm>
-            <a:off x="7211944" y="1819487"/>
+            <a:off x="7129600" y="3320257"/>
             <a:ext cx="1219200" cy="1219200"/>
           </a:xfrm>
           <a:prstGeom prst="rect">
@@ -16551,7 +15953,7 @@
         </p:blipFill>
         <p:spPr>
           <a:xfrm>
-            <a:off x="5624857" y="4609800"/>
+            <a:off x="7192200" y="4609800"/>
             <a:ext cx="1219200" cy="1219200"/>
           </a:xfrm>
           <a:prstGeom prst="rect">
@@ -16582,7 +15984,7 @@
         </p:blipFill>
         <p:spPr>
           <a:xfrm>
-            <a:off x="7284514" y="3295545"/>
+            <a:off x="8757800" y="466143"/>
             <a:ext cx="1219200" cy="1219200"/>
           </a:xfrm>
           <a:prstGeom prst="rect">
@@ -16613,7 +16015,7 @@
         </p:blipFill>
         <p:spPr>
           <a:xfrm>
-            <a:off x="7309971" y="4675172"/>
+            <a:off x="8736429" y="3349857"/>
             <a:ext cx="1219200" cy="1219200"/>
           </a:xfrm>
           <a:prstGeom prst="rect">
@@ -16644,7 +16046,7 @@
         </p:blipFill>
         <p:spPr>
           <a:xfrm>
-            <a:off x="8636400" y="399829"/>
+            <a:off x="8786400" y="1865429"/>
             <a:ext cx="1219200" cy="1219200"/>
           </a:xfrm>
           <a:prstGeom prst="rect">
@@ -16675,7 +16077,7 @@
         </p:blipFill>
         <p:spPr>
           <a:xfrm>
-            <a:off x="10392629" y="488915"/>
+            <a:off x="8729630" y="4750200"/>
             <a:ext cx="1219200" cy="1219200"/>
           </a:xfrm>
           <a:prstGeom prst="rect">
@@ -16706,7 +16108,7 @@
         </p:blipFill>
         <p:spPr>
           <a:xfrm>
-            <a:off x="8731257" y="1827630"/>
+            <a:off x="10436800" y="3320257"/>
             <a:ext cx="1219200" cy="1219200"/>
           </a:xfrm>
           <a:prstGeom prst="rect">
@@ -16737,7 +16139,7 @@
         </p:blipFill>
         <p:spPr>
           <a:xfrm>
-            <a:off x="8784057" y="4774428"/>
+            <a:off x="10525357" y="1988914"/>
             <a:ext cx="1219200" cy="1219200"/>
           </a:xfrm>
           <a:prstGeom prst="rect">
@@ -16768,7 +16170,7 @@
         </p:blipFill>
         <p:spPr>
           <a:xfrm>
-            <a:off x="10396399" y="3390600"/>
+            <a:off x="10436800" y="466143"/>
             <a:ext cx="1219200" cy="1219200"/>
           </a:xfrm>
           <a:prstGeom prst="rect">
@@ -16799,7 +16201,7 @@
         </p:blipFill>
         <p:spPr>
           <a:xfrm>
-            <a:off x="10349658" y="2076345"/>
+            <a:off x="249658" y="1685343"/>
             <a:ext cx="1219200" cy="1219200"/>
           </a:xfrm>
           <a:prstGeom prst="rect">
@@ -16830,7 +16232,7 @@
         </p:blipFill>
         <p:spPr>
           <a:xfrm>
-            <a:off x="8773943" y="3438915"/>
+            <a:off x="249658" y="325857"/>
             <a:ext cx="1219200" cy="1219200"/>
           </a:xfrm>
           <a:prstGeom prst="rect">
@@ -16841,7 +16243,7 @@
     </p:spTree>
     <p:extLst>
       <p:ext uri="{BB962C8B-B14F-4D97-AF65-F5344CB8AC3E}">
-        <p14:creationId xmlns:p14="http://schemas.microsoft.com/office/powerpoint/2010/main" val="214978686"/>
+        <p14:creationId xmlns:p14="http://schemas.microsoft.com/office/powerpoint/2010/main" val="438152526"/>
       </p:ext>
     </p:extLst>
   </p:cSld>
@@ -16965,6 +16367,873 @@
         </p:blipFill>
         <p:spPr>
           <a:xfrm>
+            <a:off x="297543" y="293914"/>
+            <a:ext cx="1219200" cy="1219200"/>
+          </a:xfrm>
+          <a:prstGeom prst="rect">
+            <a:avLst/>
+          </a:prstGeom>
+        </p:spPr>
+      </p:pic>
+      <p:pic>
+        <p:nvPicPr>
+          <p:cNvPr id="3" name="Picture 2"/>
+          <p:cNvPicPr>
+            <a:picLocks noChangeAspect="1"/>
+          </p:cNvPicPr>
+          <p:nvPr/>
+        </p:nvPicPr>
+        <p:blipFill>
+          <a:blip r:embed="rId3">
+            <a:lum bright="70000" contrast="-70000"/>
+            <a:extLst>
+              <a:ext uri="{28A0092B-C50C-407E-A947-70E740481C1C}">
+                <a14:useLocalDpi xmlns:a14="http://schemas.microsoft.com/office/drawing/2010/main" val="0"/>
+              </a:ext>
+            </a:extLst>
+          </a:blip>
+          <a:stretch>
+            <a:fillRect/>
+          </a:stretch>
+        </p:blipFill>
+        <p:spPr>
+          <a:xfrm>
+            <a:off x="297543" y="1670372"/>
+            <a:ext cx="1219200" cy="1219200"/>
+          </a:xfrm>
+          <a:prstGeom prst="rect">
+            <a:avLst/>
+          </a:prstGeom>
+        </p:spPr>
+      </p:pic>
+      <p:pic>
+        <p:nvPicPr>
+          <p:cNvPr id="4" name="Picture 3"/>
+          <p:cNvPicPr>
+            <a:picLocks noChangeAspect="1"/>
+          </p:cNvPicPr>
+          <p:nvPr/>
+        </p:nvPicPr>
+        <p:blipFill>
+          <a:blip r:embed="rId4">
+            <a:lum bright="70000" contrast="-70000"/>
+            <a:extLst>
+              <a:ext uri="{28A0092B-C50C-407E-A947-70E740481C1C}">
+                <a14:useLocalDpi xmlns:a14="http://schemas.microsoft.com/office/drawing/2010/main" val="0"/>
+              </a:ext>
+            </a:extLst>
+          </a:blip>
+          <a:stretch>
+            <a:fillRect/>
+          </a:stretch>
+        </p:blipFill>
+        <p:spPr>
+          <a:xfrm>
+            <a:off x="375086" y="4580546"/>
+            <a:ext cx="1219200" cy="1219200"/>
+          </a:xfrm>
+          <a:prstGeom prst="rect">
+            <a:avLst/>
+          </a:prstGeom>
+        </p:spPr>
+      </p:pic>
+      <p:pic>
+        <p:nvPicPr>
+          <p:cNvPr id="5" name="Picture 4"/>
+          <p:cNvPicPr>
+            <a:picLocks noChangeAspect="1"/>
+          </p:cNvPicPr>
+          <p:nvPr/>
+        </p:nvPicPr>
+        <p:blipFill>
+          <a:blip r:embed="rId5">
+            <a:lum bright="70000" contrast="-70000"/>
+            <a:extLst>
+              <a:ext uri="{28A0092B-C50C-407E-A947-70E740481C1C}">
+                <a14:useLocalDpi xmlns:a14="http://schemas.microsoft.com/office/drawing/2010/main" val="0"/>
+              </a:ext>
+            </a:extLst>
+          </a:blip>
+          <a:stretch>
+            <a:fillRect/>
+          </a:stretch>
+        </p:blipFill>
+        <p:spPr>
+          <a:xfrm>
+            <a:off x="355657" y="3046830"/>
+            <a:ext cx="1219200" cy="1219200"/>
+          </a:xfrm>
+          <a:prstGeom prst="rect">
+            <a:avLst/>
+          </a:prstGeom>
+        </p:spPr>
+      </p:pic>
+      <p:pic>
+        <p:nvPicPr>
+          <p:cNvPr id="6" name="Picture 5"/>
+          <p:cNvPicPr>
+            <a:picLocks noChangeAspect="1"/>
+          </p:cNvPicPr>
+          <p:nvPr/>
+        </p:nvPicPr>
+        <p:blipFill>
+          <a:blip r:embed="rId6">
+            <a:lum bright="70000" contrast="-70000"/>
+            <a:extLst>
+              <a:ext uri="{28A0092B-C50C-407E-A947-70E740481C1C}">
+                <a14:useLocalDpi xmlns:a14="http://schemas.microsoft.com/office/drawing/2010/main" val="0"/>
+              </a:ext>
+            </a:extLst>
+          </a:blip>
+          <a:stretch>
+            <a:fillRect/>
+          </a:stretch>
+        </p:blipFill>
+        <p:spPr>
+          <a:xfrm>
+            <a:off x="2065943" y="219000"/>
+            <a:ext cx="1219200" cy="1219200"/>
+          </a:xfrm>
+          <a:prstGeom prst="rect">
+            <a:avLst/>
+          </a:prstGeom>
+        </p:spPr>
+      </p:pic>
+      <p:pic>
+        <p:nvPicPr>
+          <p:cNvPr id="7" name="Picture 6"/>
+          <p:cNvPicPr>
+            <a:picLocks noChangeAspect="1"/>
+          </p:cNvPicPr>
+          <p:nvPr/>
+        </p:nvPicPr>
+        <p:blipFill>
+          <a:blip r:embed="rId7">
+            <a:lum bright="70000" contrast="-70000"/>
+            <a:extLst>
+              <a:ext uri="{28A0092B-C50C-407E-A947-70E740481C1C}">
+                <a14:useLocalDpi xmlns:a14="http://schemas.microsoft.com/office/drawing/2010/main" val="0"/>
+              </a:ext>
+            </a:extLst>
+          </a:blip>
+          <a:stretch>
+            <a:fillRect/>
+          </a:stretch>
+        </p:blipFill>
+        <p:spPr>
+          <a:xfrm>
+            <a:off x="2065943" y="3100200"/>
+            <a:ext cx="1219200" cy="1219200"/>
+          </a:xfrm>
+          <a:prstGeom prst="rect">
+            <a:avLst/>
+          </a:prstGeom>
+        </p:spPr>
+      </p:pic>
+      <p:pic>
+        <p:nvPicPr>
+          <p:cNvPr id="8" name="Picture 7"/>
+          <p:cNvPicPr>
+            <a:picLocks noChangeAspect="1"/>
+          </p:cNvPicPr>
+          <p:nvPr/>
+        </p:nvPicPr>
+        <p:blipFill>
+          <a:blip r:embed="rId8">
+            <a:lum bright="70000" contrast="-70000"/>
+            <a:extLst>
+              <a:ext uri="{28A0092B-C50C-407E-A947-70E740481C1C}">
+                <a14:useLocalDpi xmlns:a14="http://schemas.microsoft.com/office/drawing/2010/main" val="0"/>
+              </a:ext>
+            </a:extLst>
+          </a:blip>
+          <a:stretch>
+            <a:fillRect/>
+          </a:stretch>
+        </p:blipFill>
+        <p:spPr>
+          <a:xfrm>
+            <a:off x="1974058" y="1670372"/>
+            <a:ext cx="1219200" cy="1219200"/>
+          </a:xfrm>
+          <a:prstGeom prst="rect">
+            <a:avLst/>
+          </a:prstGeom>
+        </p:spPr>
+      </p:pic>
+      <p:pic>
+        <p:nvPicPr>
+          <p:cNvPr id="9" name="Picture 8"/>
+          <p:cNvPicPr>
+            <a:picLocks noChangeAspect="1"/>
+          </p:cNvPicPr>
+          <p:nvPr/>
+        </p:nvPicPr>
+        <p:blipFill>
+          <a:blip r:embed="rId9">
+            <a:lum bright="70000" contrast="-70000"/>
+            <a:extLst>
+              <a:ext uri="{28A0092B-C50C-407E-A947-70E740481C1C}">
+                <a14:useLocalDpi xmlns:a14="http://schemas.microsoft.com/office/drawing/2010/main" val="0"/>
+              </a:ext>
+            </a:extLst>
+          </a:blip>
+          <a:stretch>
+            <a:fillRect/>
+          </a:stretch>
+        </p:blipFill>
+        <p:spPr>
+          <a:xfrm>
+            <a:off x="2030971" y="4594343"/>
+            <a:ext cx="1219200" cy="1219200"/>
+          </a:xfrm>
+          <a:prstGeom prst="rect">
+            <a:avLst/>
+          </a:prstGeom>
+        </p:spPr>
+      </p:pic>
+      <p:pic>
+        <p:nvPicPr>
+          <p:cNvPr id="10" name="Picture 9"/>
+          <p:cNvPicPr>
+            <a:picLocks noChangeAspect="1"/>
+          </p:cNvPicPr>
+          <p:nvPr/>
+        </p:nvPicPr>
+        <p:blipFill>
+          <a:blip r:embed="rId10">
+            <a:lum bright="70000" contrast="-70000"/>
+            <a:extLst>
+              <a:ext uri="{28A0092B-C50C-407E-A947-70E740481C1C}">
+                <a14:useLocalDpi xmlns:a14="http://schemas.microsoft.com/office/drawing/2010/main" val="0"/>
+              </a:ext>
+            </a:extLst>
+          </a:blip>
+          <a:stretch>
+            <a:fillRect/>
+          </a:stretch>
+        </p:blipFill>
+        <p:spPr>
+          <a:xfrm>
+            <a:off x="3834343" y="219000"/>
+            <a:ext cx="1219200" cy="1219200"/>
+          </a:xfrm>
+          <a:prstGeom prst="rect">
+            <a:avLst/>
+          </a:prstGeom>
+        </p:spPr>
+      </p:pic>
+      <p:pic>
+        <p:nvPicPr>
+          <p:cNvPr id="11" name="Picture 10"/>
+          <p:cNvPicPr>
+            <a:picLocks noChangeAspect="1"/>
+          </p:cNvPicPr>
+          <p:nvPr/>
+        </p:nvPicPr>
+        <p:blipFill>
+          <a:blip r:embed="rId11">
+            <a:lum bright="70000" contrast="-70000"/>
+            <a:extLst>
+              <a:ext uri="{28A0092B-C50C-407E-A947-70E740481C1C}">
+                <a14:useLocalDpi xmlns:a14="http://schemas.microsoft.com/office/drawing/2010/main" val="0"/>
+              </a:ext>
+            </a:extLst>
+          </a:blip>
+          <a:stretch>
+            <a:fillRect/>
+          </a:stretch>
+        </p:blipFill>
+        <p:spPr>
+          <a:xfrm>
+            <a:off x="3939743" y="4580546"/>
+            <a:ext cx="1219200" cy="1219200"/>
+          </a:xfrm>
+          <a:prstGeom prst="rect">
+            <a:avLst/>
+          </a:prstGeom>
+        </p:spPr>
+      </p:pic>
+      <p:pic>
+        <p:nvPicPr>
+          <p:cNvPr id="12" name="Picture 11"/>
+          <p:cNvPicPr>
+            <a:picLocks noChangeAspect="1"/>
+          </p:cNvPicPr>
+          <p:nvPr/>
+        </p:nvPicPr>
+        <p:blipFill>
+          <a:blip r:embed="rId12">
+            <a:lum bright="70000" contrast="-70000"/>
+            <a:extLst>
+              <a:ext uri="{28A0092B-C50C-407E-A947-70E740481C1C}">
+                <a14:useLocalDpi xmlns:a14="http://schemas.microsoft.com/office/drawing/2010/main" val="0"/>
+              </a:ext>
+            </a:extLst>
+          </a:blip>
+          <a:stretch>
+            <a:fillRect/>
+          </a:stretch>
+        </p:blipFill>
+        <p:spPr>
+          <a:xfrm>
+            <a:off x="3894857" y="1708115"/>
+            <a:ext cx="1219200" cy="1219200"/>
+          </a:xfrm>
+          <a:prstGeom prst="rect">
+            <a:avLst/>
+          </a:prstGeom>
+        </p:spPr>
+      </p:pic>
+      <p:pic>
+        <p:nvPicPr>
+          <p:cNvPr id="13" name="Picture 12"/>
+          <p:cNvPicPr>
+            <a:picLocks noChangeAspect="1"/>
+          </p:cNvPicPr>
+          <p:nvPr/>
+        </p:nvPicPr>
+        <p:blipFill>
+          <a:blip r:embed="rId13">
+            <a:lum bright="70000" contrast="-70000"/>
+            <a:extLst>
+              <a:ext uri="{28A0092B-C50C-407E-A947-70E740481C1C}">
+                <a14:useLocalDpi xmlns:a14="http://schemas.microsoft.com/office/drawing/2010/main" val="0"/>
+              </a:ext>
+            </a:extLst>
+          </a:blip>
+          <a:stretch>
+            <a:fillRect/>
+          </a:stretch>
+        </p:blipFill>
+        <p:spPr>
+          <a:xfrm>
+            <a:off x="3941886" y="3046830"/>
+            <a:ext cx="1219200" cy="1219200"/>
+          </a:xfrm>
+          <a:prstGeom prst="rect">
+            <a:avLst/>
+          </a:prstGeom>
+        </p:spPr>
+      </p:pic>
+      <p:pic>
+        <p:nvPicPr>
+          <p:cNvPr id="14" name="Picture 13"/>
+          <p:cNvPicPr>
+            <a:picLocks noChangeAspect="1"/>
+          </p:cNvPicPr>
+          <p:nvPr/>
+        </p:nvPicPr>
+        <p:blipFill>
+          <a:blip r:embed="rId14">
+            <a:lum bright="70000" contrast="-70000"/>
+            <a:extLst>
+              <a:ext uri="{28A0092B-C50C-407E-A947-70E740481C1C}">
+                <a14:useLocalDpi xmlns:a14="http://schemas.microsoft.com/office/drawing/2010/main" val="0"/>
+              </a:ext>
+            </a:extLst>
+          </a:blip>
+          <a:stretch>
+            <a:fillRect/>
+          </a:stretch>
+        </p:blipFill>
+        <p:spPr>
+          <a:xfrm>
+            <a:off x="5571372" y="1767343"/>
+            <a:ext cx="1219200" cy="1219200"/>
+          </a:xfrm>
+          <a:prstGeom prst="rect">
+            <a:avLst/>
+          </a:prstGeom>
+        </p:spPr>
+      </p:pic>
+      <p:pic>
+        <p:nvPicPr>
+          <p:cNvPr id="15" name="Picture 14"/>
+          <p:cNvPicPr>
+            <a:picLocks noChangeAspect="1"/>
+          </p:cNvPicPr>
+          <p:nvPr/>
+        </p:nvPicPr>
+        <p:blipFill>
+          <a:blip r:embed="rId15">
+            <a:lum bright="70000" contrast="-70000"/>
+            <a:extLst>
+              <a:ext uri="{28A0092B-C50C-407E-A947-70E740481C1C}">
+                <a14:useLocalDpi xmlns:a14="http://schemas.microsoft.com/office/drawing/2010/main" val="0"/>
+              </a:ext>
+            </a:extLst>
+          </a:blip>
+          <a:stretch>
+            <a:fillRect/>
+          </a:stretch>
+        </p:blipFill>
+        <p:spPr>
+          <a:xfrm>
+            <a:off x="5602743" y="293914"/>
+            <a:ext cx="1219200" cy="1219200"/>
+          </a:xfrm>
+          <a:prstGeom prst="rect">
+            <a:avLst/>
+          </a:prstGeom>
+        </p:spPr>
+      </p:pic>
+      <p:pic>
+        <p:nvPicPr>
+          <p:cNvPr id="16" name="Picture 15"/>
+          <p:cNvPicPr>
+            <a:picLocks noChangeAspect="1"/>
+          </p:cNvPicPr>
+          <p:nvPr/>
+        </p:nvPicPr>
+        <p:blipFill>
+          <a:blip r:embed="rId16">
+            <a:lum bright="70000" contrast="-70000"/>
+            <a:extLst>
+              <a:ext uri="{28A0092B-C50C-407E-A947-70E740481C1C}">
+                <a14:useLocalDpi xmlns:a14="http://schemas.microsoft.com/office/drawing/2010/main" val="0"/>
+              </a:ext>
+            </a:extLst>
+          </a:blip>
+          <a:stretch>
+            <a:fillRect/>
+          </a:stretch>
+        </p:blipFill>
+        <p:spPr>
+          <a:xfrm>
+            <a:off x="5571372" y="3240772"/>
+            <a:ext cx="1219200" cy="1219200"/>
+          </a:xfrm>
+          <a:prstGeom prst="rect">
+            <a:avLst/>
+          </a:prstGeom>
+        </p:spPr>
+      </p:pic>
+      <p:pic>
+        <p:nvPicPr>
+          <p:cNvPr id="17" name="Picture 16"/>
+          <p:cNvPicPr>
+            <a:picLocks noChangeAspect="1"/>
+          </p:cNvPicPr>
+          <p:nvPr/>
+        </p:nvPicPr>
+        <p:blipFill>
+          <a:blip r:embed="rId17">
+            <a:lum bright="70000" contrast="-70000"/>
+            <a:extLst>
+              <a:ext uri="{28A0092B-C50C-407E-A947-70E740481C1C}">
+                <a14:useLocalDpi xmlns:a14="http://schemas.microsoft.com/office/drawing/2010/main" val="0"/>
+              </a:ext>
+            </a:extLst>
+          </a:blip>
+          <a:stretch>
+            <a:fillRect/>
+          </a:stretch>
+        </p:blipFill>
+        <p:spPr>
+          <a:xfrm>
+            <a:off x="7117200" y="388543"/>
+            <a:ext cx="1219200" cy="1219200"/>
+          </a:xfrm>
+          <a:prstGeom prst="rect">
+            <a:avLst/>
+          </a:prstGeom>
+        </p:spPr>
+      </p:pic>
+      <p:pic>
+        <p:nvPicPr>
+          <p:cNvPr id="18" name="Picture 17"/>
+          <p:cNvPicPr>
+            <a:picLocks noChangeAspect="1"/>
+          </p:cNvPicPr>
+          <p:nvPr/>
+        </p:nvPicPr>
+        <p:blipFill>
+          <a:blip r:embed="rId18">
+            <a:lum bright="70000" contrast="-70000"/>
+            <a:extLst>
+              <a:ext uri="{28A0092B-C50C-407E-A947-70E740481C1C}">
+                <a14:useLocalDpi xmlns:a14="http://schemas.microsoft.com/office/drawing/2010/main" val="0"/>
+              </a:ext>
+            </a:extLst>
+          </a:blip>
+          <a:stretch>
+            <a:fillRect/>
+          </a:stretch>
+        </p:blipFill>
+        <p:spPr>
+          <a:xfrm>
+            <a:off x="7211944" y="1819487"/>
+            <a:ext cx="1219200" cy="1219200"/>
+          </a:xfrm>
+          <a:prstGeom prst="rect">
+            <a:avLst/>
+          </a:prstGeom>
+        </p:spPr>
+      </p:pic>
+      <p:pic>
+        <p:nvPicPr>
+          <p:cNvPr id="19" name="Picture 18"/>
+          <p:cNvPicPr>
+            <a:picLocks noChangeAspect="1"/>
+          </p:cNvPicPr>
+          <p:nvPr/>
+        </p:nvPicPr>
+        <p:blipFill>
+          <a:blip r:embed="rId19">
+            <a:lum bright="70000" contrast="-70000"/>
+            <a:extLst>
+              <a:ext uri="{28A0092B-C50C-407E-A947-70E740481C1C}">
+                <a14:useLocalDpi xmlns:a14="http://schemas.microsoft.com/office/drawing/2010/main" val="0"/>
+              </a:ext>
+            </a:extLst>
+          </a:blip>
+          <a:stretch>
+            <a:fillRect/>
+          </a:stretch>
+        </p:blipFill>
+        <p:spPr>
+          <a:xfrm>
+            <a:off x="5624857" y="4609800"/>
+            <a:ext cx="1219200" cy="1219200"/>
+          </a:xfrm>
+          <a:prstGeom prst="rect">
+            <a:avLst/>
+          </a:prstGeom>
+        </p:spPr>
+      </p:pic>
+      <p:pic>
+        <p:nvPicPr>
+          <p:cNvPr id="20" name="Picture 19"/>
+          <p:cNvPicPr>
+            <a:picLocks noChangeAspect="1"/>
+          </p:cNvPicPr>
+          <p:nvPr/>
+        </p:nvPicPr>
+        <p:blipFill>
+          <a:blip r:embed="rId20">
+            <a:lum bright="70000" contrast="-70000"/>
+            <a:extLst>
+              <a:ext uri="{28A0092B-C50C-407E-A947-70E740481C1C}">
+                <a14:useLocalDpi xmlns:a14="http://schemas.microsoft.com/office/drawing/2010/main" val="0"/>
+              </a:ext>
+            </a:extLst>
+          </a:blip>
+          <a:stretch>
+            <a:fillRect/>
+          </a:stretch>
+        </p:blipFill>
+        <p:spPr>
+          <a:xfrm>
+            <a:off x="7284514" y="3295545"/>
+            <a:ext cx="1219200" cy="1219200"/>
+          </a:xfrm>
+          <a:prstGeom prst="rect">
+            <a:avLst/>
+          </a:prstGeom>
+        </p:spPr>
+      </p:pic>
+      <p:pic>
+        <p:nvPicPr>
+          <p:cNvPr id="21" name="Picture 20"/>
+          <p:cNvPicPr>
+            <a:picLocks noChangeAspect="1"/>
+          </p:cNvPicPr>
+          <p:nvPr/>
+        </p:nvPicPr>
+        <p:blipFill>
+          <a:blip r:embed="rId21">
+            <a:lum bright="70000" contrast="-70000"/>
+            <a:extLst>
+              <a:ext uri="{28A0092B-C50C-407E-A947-70E740481C1C}">
+                <a14:useLocalDpi xmlns:a14="http://schemas.microsoft.com/office/drawing/2010/main" val="0"/>
+              </a:ext>
+            </a:extLst>
+          </a:blip>
+          <a:stretch>
+            <a:fillRect/>
+          </a:stretch>
+        </p:blipFill>
+        <p:spPr>
+          <a:xfrm>
+            <a:off x="7309971" y="4675172"/>
+            <a:ext cx="1219200" cy="1219200"/>
+          </a:xfrm>
+          <a:prstGeom prst="rect">
+            <a:avLst/>
+          </a:prstGeom>
+        </p:spPr>
+      </p:pic>
+      <p:pic>
+        <p:nvPicPr>
+          <p:cNvPr id="22" name="Picture 21"/>
+          <p:cNvPicPr>
+            <a:picLocks noChangeAspect="1"/>
+          </p:cNvPicPr>
+          <p:nvPr/>
+        </p:nvPicPr>
+        <p:blipFill>
+          <a:blip r:embed="rId22">
+            <a:lum bright="70000" contrast="-70000"/>
+            <a:extLst>
+              <a:ext uri="{28A0092B-C50C-407E-A947-70E740481C1C}">
+                <a14:useLocalDpi xmlns:a14="http://schemas.microsoft.com/office/drawing/2010/main" val="0"/>
+              </a:ext>
+            </a:extLst>
+          </a:blip>
+          <a:stretch>
+            <a:fillRect/>
+          </a:stretch>
+        </p:blipFill>
+        <p:spPr>
+          <a:xfrm>
+            <a:off x="8636400" y="399829"/>
+            <a:ext cx="1219200" cy="1219200"/>
+          </a:xfrm>
+          <a:prstGeom prst="rect">
+            <a:avLst/>
+          </a:prstGeom>
+        </p:spPr>
+      </p:pic>
+      <p:pic>
+        <p:nvPicPr>
+          <p:cNvPr id="23" name="Picture 22"/>
+          <p:cNvPicPr>
+            <a:picLocks noChangeAspect="1"/>
+          </p:cNvPicPr>
+          <p:nvPr/>
+        </p:nvPicPr>
+        <p:blipFill>
+          <a:blip r:embed="rId23">
+            <a:lum bright="70000" contrast="-70000"/>
+            <a:extLst>
+              <a:ext uri="{28A0092B-C50C-407E-A947-70E740481C1C}">
+                <a14:useLocalDpi xmlns:a14="http://schemas.microsoft.com/office/drawing/2010/main" val="0"/>
+              </a:ext>
+            </a:extLst>
+          </a:blip>
+          <a:stretch>
+            <a:fillRect/>
+          </a:stretch>
+        </p:blipFill>
+        <p:spPr>
+          <a:xfrm>
+            <a:off x="10392629" y="488915"/>
+            <a:ext cx="1219200" cy="1219200"/>
+          </a:xfrm>
+          <a:prstGeom prst="rect">
+            <a:avLst/>
+          </a:prstGeom>
+        </p:spPr>
+      </p:pic>
+      <p:pic>
+        <p:nvPicPr>
+          <p:cNvPr id="24" name="Picture 23"/>
+          <p:cNvPicPr>
+            <a:picLocks noChangeAspect="1"/>
+          </p:cNvPicPr>
+          <p:nvPr/>
+        </p:nvPicPr>
+        <p:blipFill>
+          <a:blip r:embed="rId24">
+            <a:lum bright="70000" contrast="-70000"/>
+            <a:extLst>
+              <a:ext uri="{28A0092B-C50C-407E-A947-70E740481C1C}">
+                <a14:useLocalDpi xmlns:a14="http://schemas.microsoft.com/office/drawing/2010/main" val="0"/>
+              </a:ext>
+            </a:extLst>
+          </a:blip>
+          <a:stretch>
+            <a:fillRect/>
+          </a:stretch>
+        </p:blipFill>
+        <p:spPr>
+          <a:xfrm>
+            <a:off x="8731257" y="1827630"/>
+            <a:ext cx="1219200" cy="1219200"/>
+          </a:xfrm>
+          <a:prstGeom prst="rect">
+            <a:avLst/>
+          </a:prstGeom>
+        </p:spPr>
+      </p:pic>
+      <p:pic>
+        <p:nvPicPr>
+          <p:cNvPr id="25" name="Picture 24"/>
+          <p:cNvPicPr>
+            <a:picLocks noChangeAspect="1"/>
+          </p:cNvPicPr>
+          <p:nvPr/>
+        </p:nvPicPr>
+        <p:blipFill>
+          <a:blip r:embed="rId25">
+            <a:lum bright="70000" contrast="-70000"/>
+            <a:extLst>
+              <a:ext uri="{28A0092B-C50C-407E-A947-70E740481C1C}">
+                <a14:useLocalDpi xmlns:a14="http://schemas.microsoft.com/office/drawing/2010/main" val="0"/>
+              </a:ext>
+            </a:extLst>
+          </a:blip>
+          <a:stretch>
+            <a:fillRect/>
+          </a:stretch>
+        </p:blipFill>
+        <p:spPr>
+          <a:xfrm>
+            <a:off x="8784057" y="4774428"/>
+            <a:ext cx="1219200" cy="1219200"/>
+          </a:xfrm>
+          <a:prstGeom prst="rect">
+            <a:avLst/>
+          </a:prstGeom>
+        </p:spPr>
+      </p:pic>
+      <p:pic>
+        <p:nvPicPr>
+          <p:cNvPr id="26" name="Picture 25"/>
+          <p:cNvPicPr>
+            <a:picLocks noChangeAspect="1"/>
+          </p:cNvPicPr>
+          <p:nvPr/>
+        </p:nvPicPr>
+        <p:blipFill>
+          <a:blip r:embed="rId26">
+            <a:lum bright="70000" contrast="-70000"/>
+            <a:extLst>
+              <a:ext uri="{28A0092B-C50C-407E-A947-70E740481C1C}">
+                <a14:useLocalDpi xmlns:a14="http://schemas.microsoft.com/office/drawing/2010/main" val="0"/>
+              </a:ext>
+            </a:extLst>
+          </a:blip>
+          <a:stretch>
+            <a:fillRect/>
+          </a:stretch>
+        </p:blipFill>
+        <p:spPr>
+          <a:xfrm>
+            <a:off x="10396399" y="3390600"/>
+            <a:ext cx="1219200" cy="1219200"/>
+          </a:xfrm>
+          <a:prstGeom prst="rect">
+            <a:avLst/>
+          </a:prstGeom>
+        </p:spPr>
+      </p:pic>
+      <p:pic>
+        <p:nvPicPr>
+          <p:cNvPr id="27" name="Picture 26"/>
+          <p:cNvPicPr>
+            <a:picLocks noChangeAspect="1"/>
+          </p:cNvPicPr>
+          <p:nvPr/>
+        </p:nvPicPr>
+        <p:blipFill>
+          <a:blip r:embed="rId27">
+            <a:lum bright="70000" contrast="-70000"/>
+            <a:extLst>
+              <a:ext uri="{28A0092B-C50C-407E-A947-70E740481C1C}">
+                <a14:useLocalDpi xmlns:a14="http://schemas.microsoft.com/office/drawing/2010/main" val="0"/>
+              </a:ext>
+            </a:extLst>
+          </a:blip>
+          <a:stretch>
+            <a:fillRect/>
+          </a:stretch>
+        </p:blipFill>
+        <p:spPr>
+          <a:xfrm>
+            <a:off x="10349658" y="2076345"/>
+            <a:ext cx="1219200" cy="1219200"/>
+          </a:xfrm>
+          <a:prstGeom prst="rect">
+            <a:avLst/>
+          </a:prstGeom>
+        </p:spPr>
+      </p:pic>
+      <p:pic>
+        <p:nvPicPr>
+          <p:cNvPr id="28" name="Picture 27"/>
+          <p:cNvPicPr>
+            <a:picLocks noChangeAspect="1"/>
+          </p:cNvPicPr>
+          <p:nvPr/>
+        </p:nvPicPr>
+        <p:blipFill>
+          <a:blip r:embed="rId28">
+            <a:lum bright="70000" contrast="-70000"/>
+            <a:extLst>
+              <a:ext uri="{28A0092B-C50C-407E-A947-70E740481C1C}">
+                <a14:useLocalDpi xmlns:a14="http://schemas.microsoft.com/office/drawing/2010/main" val="0"/>
+              </a:ext>
+            </a:extLst>
+          </a:blip>
+          <a:stretch>
+            <a:fillRect/>
+          </a:stretch>
+        </p:blipFill>
+        <p:spPr>
+          <a:xfrm>
+            <a:off x="8773943" y="3438915"/>
+            <a:ext cx="1219200" cy="1219200"/>
+          </a:xfrm>
+          <a:prstGeom prst="rect">
+            <a:avLst/>
+          </a:prstGeom>
+        </p:spPr>
+      </p:pic>
+    </p:spTree>
+    <p:extLst>
+      <p:ext uri="{BB962C8B-B14F-4D97-AF65-F5344CB8AC3E}">
+        <p14:creationId xmlns:p14="http://schemas.microsoft.com/office/powerpoint/2010/main" val="214978686"/>
+      </p:ext>
+    </p:extLst>
+  </p:cSld>
+  <p:clrMapOvr>
+    <a:masterClrMapping/>
+  </p:clrMapOvr>
+</p:sld>
+</file>
+
+<file path=ppt/slides/slide41.xml><?xml version="1.0" encoding="utf-8"?>
+<p:sld xmlns:a="http://schemas.openxmlformats.org/drawingml/2006/main" xmlns:r="http://schemas.openxmlformats.org/officeDocument/2006/relationships" xmlns:p="http://schemas.openxmlformats.org/presentationml/2006/main" show="0">
+  <p:cSld>
+    <p:spTree>
+      <p:nvGrpSpPr>
+        <p:cNvPr id="1" name=""/>
+        <p:cNvGrpSpPr/>
+        <p:nvPr/>
+      </p:nvGrpSpPr>
+      <p:grpSpPr>
+        <a:xfrm>
+          <a:off x="0" y="0"/>
+          <a:ext cx="0" cy="0"/>
+          <a:chOff x="0" y="0"/>
+          <a:chExt cx="0" cy="0"/>
+        </a:xfrm>
+      </p:grpSpPr>
+      <p:pic>
+        <p:nvPicPr>
+          <p:cNvPr id="2" name="Picture 1"/>
+          <p:cNvPicPr>
+            <a:picLocks noChangeAspect="1"/>
+          </p:cNvPicPr>
+          <p:nvPr/>
+        </p:nvPicPr>
+        <p:blipFill>
+          <a:blip r:embed="rId2">
+            <a:lum bright="70000" contrast="-70000"/>
+            <a:extLst>
+              <a:ext uri="{28A0092B-C50C-407E-A947-70E740481C1C}">
+                <a14:useLocalDpi xmlns:a14="http://schemas.microsoft.com/office/drawing/2010/main" val="0"/>
+              </a:ext>
+            </a:extLst>
+          </a:blip>
+          <a:stretch>
+            <a:fillRect/>
+          </a:stretch>
+        </p:blipFill>
+        <p:spPr>
+          <a:xfrm>
             <a:off x="304800" y="373743"/>
             <a:ext cx="1219200" cy="1219200"/>
           </a:xfrm>
@@ -17637,7 +17906,7 @@
 </p:sld>
 </file>
 
-<file path=ppt/slides/slide41.xml><?xml version="1.0" encoding="utf-8"?>
+<file path=ppt/slides/slide42.xml><?xml version="1.0" encoding="utf-8"?>
 <p:sld xmlns:a="http://schemas.openxmlformats.org/drawingml/2006/main" xmlns:r="http://schemas.openxmlformats.org/officeDocument/2006/relationships" xmlns:p="http://schemas.openxmlformats.org/presentationml/2006/main" show="0">
   <p:cSld>
     <p:spTree>
@@ -19094,21 +19363,6 @@
 </file>
 
 <file path=customXml/item1.xml><?xml version="1.0" encoding="utf-8"?>
-<?mso-contentType ?>
-<FormTemplates xmlns="http://schemas.microsoft.com/sharepoint/v3/contenttype/forms">
-  <Display>DocumentLibraryForm</Display>
-  <Edit>DocumentLibraryForm</Edit>
-  <New>DocumentLibraryForm</New>
-</FormTemplates>
-</file>
-
-<file path=customXml/item2.xml><?xml version="1.0" encoding="utf-8"?>
-<p:properties xmlns:p="http://schemas.microsoft.com/office/2006/metadata/properties" xmlns:xsi="http://www.w3.org/2001/XMLSchema-instance" xmlns:pc="http://schemas.microsoft.com/office/infopath/2007/PartnerControls">
-  <documentManagement/>
-</p:properties>
-</file>
-
-<file path=customXml/item3.xml><?xml version="1.0" encoding="utf-8"?>
 <ct:contentTypeSchema xmlns:ct="http://schemas.microsoft.com/office/2006/metadata/contentType" xmlns:ma="http://schemas.microsoft.com/office/2006/metadata/properties/metaAttributes" ct:_="" ma:_="" ma:contentTypeName="Document" ma:contentTypeID="0x010100CFD7474EC5F9804A8C0915A0D2B3E72B" ma:contentTypeVersion="4" ma:contentTypeDescription="Create a new document." ma:contentTypeScope="" ma:versionID="de38eceb8279c5739942d67beb054da6">
   <xsd:schema xmlns:xsd="http://www.w3.org/2001/XMLSchema" xmlns:xs="http://www.w3.org/2001/XMLSchema" xmlns:p="http://schemas.microsoft.com/office/2006/metadata/properties" xmlns:ns2="437d3976-146d-487e-9b32-45ade7cdb3c3" xmlns:ns3="ba924082-f255-4689-bc14-7c311a17681c" targetNamespace="http://schemas.microsoft.com/office/2006/metadata/properties" ma:root="true" ma:fieldsID="007267475d84ef70300470070773cadf" ns2:_="" ns3:_="">
     <xsd:import namespace="437d3976-146d-487e-9b32-45ade7cdb3c3"/>
@@ -19273,10 +19527,36 @@
 </ct:contentTypeSchema>
 </file>
 
+<file path=customXml/item2.xml><?xml version="1.0" encoding="utf-8"?>
+<p:properties xmlns:p="http://schemas.microsoft.com/office/2006/metadata/properties" xmlns:xsi="http://www.w3.org/2001/XMLSchema-instance" xmlns:pc="http://schemas.microsoft.com/office/infopath/2007/PartnerControls">
+  <documentManagement/>
+</p:properties>
+</file>
+
+<file path=customXml/item3.xml><?xml version="1.0" encoding="utf-8"?>
+<?mso-contentType ?>
+<FormTemplates xmlns="http://schemas.microsoft.com/sharepoint/v3/contenttype/forms">
+  <Display>DocumentLibraryForm</Display>
+  <Edit>DocumentLibraryForm</Edit>
+  <New>DocumentLibraryForm</New>
+</FormTemplates>
+</file>
+
 <file path=customXml/itemProps1.xml><?xml version="1.0" encoding="utf-8"?>
-<ds:datastoreItem xmlns:ds="http://schemas.openxmlformats.org/officeDocument/2006/customXml" ds:itemID="{8F9099B0-B9E3-45A6-848D-7EA25626C078}">
+<ds:datastoreItem xmlns:ds="http://schemas.openxmlformats.org/officeDocument/2006/customXml" ds:itemID="{0ED4AD53-31E2-4B86-A289-FCB19B3987C9}">
   <ds:schemaRefs>
-    <ds:schemaRef ds:uri="http://schemas.microsoft.com/sharepoint/v3/contenttype/forms"/>
+    <ds:schemaRef ds:uri="http://schemas.microsoft.com/office/2006/metadata/contentType"/>
+    <ds:schemaRef ds:uri="http://schemas.microsoft.com/office/2006/metadata/properties/metaAttributes"/>
+    <ds:schemaRef ds:uri="http://www.w3.org/2001/XMLSchema"/>
+    <ds:schemaRef ds:uri="http://schemas.microsoft.com/office/2006/metadata/properties"/>
+    <ds:schemaRef ds:uri="437d3976-146d-487e-9b32-45ade7cdb3c3"/>
+    <ds:schemaRef ds:uri="ba924082-f255-4689-bc14-7c311a17681c"/>
+    <ds:schemaRef ds:uri="http://schemas.microsoft.com/office/2006/documentManagement/types"/>
+    <ds:schemaRef ds:uri="http://schemas.microsoft.com/office/infopath/2007/PartnerControls"/>
+    <ds:schemaRef ds:uri="http://schemas.openxmlformats.org/package/2006/metadata/core-properties"/>
+    <ds:schemaRef ds:uri="http://purl.org/dc/elements/1.1/"/>
+    <ds:schemaRef ds:uri="http://purl.org/dc/terms/"/>
+    <ds:schemaRef ds:uri="http://schemas.microsoft.com/internal/obd"/>
   </ds:schemaRefs>
 </ds:datastoreItem>
 </file>
@@ -19299,20 +19579,9 @@
 </file>
 
 <file path=customXml/itemProps3.xml><?xml version="1.0" encoding="utf-8"?>
-<ds:datastoreItem xmlns:ds="http://schemas.openxmlformats.org/officeDocument/2006/customXml" ds:itemID="{0ED4AD53-31E2-4B86-A289-FCB19B3987C9}">
+<ds:datastoreItem xmlns:ds="http://schemas.openxmlformats.org/officeDocument/2006/customXml" ds:itemID="{8F9099B0-B9E3-45A6-848D-7EA25626C078}">
   <ds:schemaRefs>
-    <ds:schemaRef ds:uri="http://schemas.microsoft.com/office/2006/metadata/contentType"/>
-    <ds:schemaRef ds:uri="http://schemas.microsoft.com/office/2006/metadata/properties/metaAttributes"/>
-    <ds:schemaRef ds:uri="http://www.w3.org/2001/XMLSchema"/>
-    <ds:schemaRef ds:uri="http://schemas.microsoft.com/office/2006/metadata/properties"/>
-    <ds:schemaRef ds:uri="437d3976-146d-487e-9b32-45ade7cdb3c3"/>
-    <ds:schemaRef ds:uri="ba924082-f255-4689-bc14-7c311a17681c"/>
-    <ds:schemaRef ds:uri="http://schemas.microsoft.com/office/2006/documentManagement/types"/>
-    <ds:schemaRef ds:uri="http://schemas.microsoft.com/office/infopath/2007/PartnerControls"/>
-    <ds:schemaRef ds:uri="http://schemas.openxmlformats.org/package/2006/metadata/core-properties"/>
-    <ds:schemaRef ds:uri="http://purl.org/dc/elements/1.1/"/>
-    <ds:schemaRef ds:uri="http://purl.org/dc/terms/"/>
-    <ds:schemaRef ds:uri="http://schemas.microsoft.com/internal/obd"/>
+    <ds:schemaRef ds:uri="http://schemas.microsoft.com/sharepoint/v3/contenttype/forms"/>
   </ds:schemaRefs>
 </ds:datastoreItem>
 </file>
</xml_diff>